<commit_message>
added more to powerpoint
</commit_message>
<xml_diff>
--- a/XFLR5 Methods and Their Application in.pptx
+++ b/XFLR5 Methods and Their Application in.pptx
@@ -9,10 +9,28 @@
     <p:sldId id="257" r:id="rId3"/>
     <p:sldId id="258" r:id="rId4"/>
     <p:sldId id="259" r:id="rId5"/>
-    <p:sldId id="261" r:id="rId6"/>
+    <p:sldId id="260" r:id="rId6"/>
+    <p:sldId id="261" r:id="rId7"/>
+    <p:sldId id="263" r:id="rId8"/>
+    <p:sldId id="276" r:id="rId9"/>
+    <p:sldId id="262" r:id="rId10"/>
+    <p:sldId id="277" r:id="rId11"/>
+    <p:sldId id="264" r:id="rId12"/>
+    <p:sldId id="265" r:id="rId13"/>
+    <p:sldId id="266" r:id="rId14"/>
+    <p:sldId id="267" r:id="rId15"/>
+    <p:sldId id="268" r:id="rId16"/>
+    <p:sldId id="269" r:id="rId17"/>
+    <p:sldId id="270" r:id="rId18"/>
+    <p:sldId id="271" r:id="rId19"/>
+    <p:sldId id="272" r:id="rId20"/>
+    <p:sldId id="275" r:id="rId21"/>
   </p:sldIdLst>
   <p:sldSz cx="9144000" cy="6858000" type="screen4x3"/>
   <p:notesSz cx="6858000" cy="9144000"/>
+  <p:custDataLst>
+    <p:tags r:id="rId22"/>
+  </p:custDataLst>
   <p:defaultTextStyle>
     <a:defPPr>
       <a:defRPr lang="en-US"/>
@@ -292,6 +310,7 @@
           <a:p>
             <a:fld id="{408CC927-4414-486E-A4EA-F55738DD0022}" type="datetimeFigureOut">
               <a:rPr lang="en-US" smtClean="0"/>
+              <a:pPr/>
               <a:t>4/30/2014</a:t>
             </a:fld>
             <a:endParaRPr lang="en-US" dirty="0"/>
@@ -334,6 +353,7 @@
           <a:p>
             <a:fld id="{A98AA4A0-CE78-441D-AF88-045EB62D3DB8}" type="slidenum">
               <a:rPr lang="en-US" smtClean="0"/>
+              <a:pPr/>
               <a:t>‹#›</a:t>
             </a:fld>
             <a:endParaRPr lang="en-US" dirty="0"/>
@@ -457,6 +477,7 @@
           <a:p>
             <a:fld id="{408CC927-4414-486E-A4EA-F55738DD0022}" type="datetimeFigureOut">
               <a:rPr lang="en-US" smtClean="0"/>
+              <a:pPr/>
               <a:t>4/30/2014</a:t>
             </a:fld>
             <a:endParaRPr lang="en-US" dirty="0"/>
@@ -499,6 +520,7 @@
           <a:p>
             <a:fld id="{A98AA4A0-CE78-441D-AF88-045EB62D3DB8}" type="slidenum">
               <a:rPr lang="en-US" smtClean="0"/>
+              <a:pPr/>
               <a:t>‹#›</a:t>
             </a:fld>
             <a:endParaRPr lang="en-US" dirty="0"/>
@@ -632,6 +654,7 @@
           <a:p>
             <a:fld id="{408CC927-4414-486E-A4EA-F55738DD0022}" type="datetimeFigureOut">
               <a:rPr lang="en-US" smtClean="0"/>
+              <a:pPr/>
               <a:t>4/30/2014</a:t>
             </a:fld>
             <a:endParaRPr lang="en-US" dirty="0"/>
@@ -674,6 +697,7 @@
           <a:p>
             <a:fld id="{A98AA4A0-CE78-441D-AF88-045EB62D3DB8}" type="slidenum">
               <a:rPr lang="en-US" smtClean="0"/>
+              <a:pPr/>
               <a:t>‹#›</a:t>
             </a:fld>
             <a:endParaRPr lang="en-US" dirty="0"/>
@@ -797,6 +821,7 @@
           <a:p>
             <a:fld id="{408CC927-4414-486E-A4EA-F55738DD0022}" type="datetimeFigureOut">
               <a:rPr lang="en-US" smtClean="0"/>
+              <a:pPr/>
               <a:t>4/30/2014</a:t>
             </a:fld>
             <a:endParaRPr lang="en-US" dirty="0"/>
@@ -839,6 +864,7 @@
           <a:p>
             <a:fld id="{A98AA4A0-CE78-441D-AF88-045EB62D3DB8}" type="slidenum">
               <a:rPr lang="en-US" smtClean="0"/>
+              <a:pPr/>
               <a:t>‹#›</a:t>
             </a:fld>
             <a:endParaRPr lang="en-US" dirty="0"/>
@@ -1038,6 +1064,7 @@
           <a:p>
             <a:fld id="{408CC927-4414-486E-A4EA-F55738DD0022}" type="datetimeFigureOut">
               <a:rPr lang="en-US" smtClean="0"/>
+              <a:pPr/>
               <a:t>4/30/2014</a:t>
             </a:fld>
             <a:endParaRPr lang="en-US" dirty="0"/>
@@ -1080,6 +1107,7 @@
           <a:p>
             <a:fld id="{A98AA4A0-CE78-441D-AF88-045EB62D3DB8}" type="slidenum">
               <a:rPr lang="en-US" smtClean="0"/>
+              <a:pPr/>
               <a:t>‹#›</a:t>
             </a:fld>
             <a:endParaRPr lang="en-US" dirty="0"/>
@@ -1321,6 +1349,7 @@
           <a:p>
             <a:fld id="{408CC927-4414-486E-A4EA-F55738DD0022}" type="datetimeFigureOut">
               <a:rPr lang="en-US" smtClean="0"/>
+              <a:pPr/>
               <a:t>4/30/2014</a:t>
             </a:fld>
             <a:endParaRPr lang="en-US" dirty="0"/>
@@ -1363,6 +1392,7 @@
           <a:p>
             <a:fld id="{A98AA4A0-CE78-441D-AF88-045EB62D3DB8}" type="slidenum">
               <a:rPr lang="en-US" smtClean="0"/>
+              <a:pPr/>
               <a:t>‹#›</a:t>
             </a:fld>
             <a:endParaRPr lang="en-US" dirty="0"/>
@@ -1738,6 +1768,7 @@
           <a:p>
             <a:fld id="{408CC927-4414-486E-A4EA-F55738DD0022}" type="datetimeFigureOut">
               <a:rPr lang="en-US" smtClean="0"/>
+              <a:pPr/>
               <a:t>4/30/2014</a:t>
             </a:fld>
             <a:endParaRPr lang="en-US" dirty="0"/>
@@ -1780,6 +1811,7 @@
           <a:p>
             <a:fld id="{A98AA4A0-CE78-441D-AF88-045EB62D3DB8}" type="slidenum">
               <a:rPr lang="en-US" smtClean="0"/>
+              <a:pPr/>
               <a:t>‹#›</a:t>
             </a:fld>
             <a:endParaRPr lang="en-US" dirty="0"/>
@@ -1851,6 +1883,7 @@
           <a:p>
             <a:fld id="{408CC927-4414-486E-A4EA-F55738DD0022}" type="datetimeFigureOut">
               <a:rPr lang="en-US" smtClean="0"/>
+              <a:pPr/>
               <a:t>4/30/2014</a:t>
             </a:fld>
             <a:endParaRPr lang="en-US" dirty="0"/>
@@ -1893,6 +1926,7 @@
           <a:p>
             <a:fld id="{A98AA4A0-CE78-441D-AF88-045EB62D3DB8}" type="slidenum">
               <a:rPr lang="en-US" smtClean="0"/>
+              <a:pPr/>
               <a:t>‹#›</a:t>
             </a:fld>
             <a:endParaRPr lang="en-US" dirty="0"/>
@@ -1941,6 +1975,7 @@
           <a:p>
             <a:fld id="{408CC927-4414-486E-A4EA-F55738DD0022}" type="datetimeFigureOut">
               <a:rPr lang="en-US" smtClean="0"/>
+              <a:pPr/>
               <a:t>4/30/2014</a:t>
             </a:fld>
             <a:endParaRPr lang="en-US" dirty="0"/>
@@ -1983,6 +2018,7 @@
           <a:p>
             <a:fld id="{A98AA4A0-CE78-441D-AF88-045EB62D3DB8}" type="slidenum">
               <a:rPr lang="en-US" smtClean="0"/>
+              <a:pPr/>
               <a:t>‹#›</a:t>
             </a:fld>
             <a:endParaRPr lang="en-US" dirty="0"/>
@@ -2213,6 +2249,7 @@
           <a:p>
             <a:fld id="{408CC927-4414-486E-A4EA-F55738DD0022}" type="datetimeFigureOut">
               <a:rPr lang="en-US" smtClean="0"/>
+              <a:pPr/>
               <a:t>4/30/2014</a:t>
             </a:fld>
             <a:endParaRPr lang="en-US" dirty="0"/>
@@ -2255,6 +2292,7 @@
           <a:p>
             <a:fld id="{A98AA4A0-CE78-441D-AF88-045EB62D3DB8}" type="slidenum">
               <a:rPr lang="en-US" smtClean="0"/>
+              <a:pPr/>
               <a:t>‹#›</a:t>
             </a:fld>
             <a:endParaRPr lang="en-US" dirty="0"/>
@@ -2461,6 +2499,7 @@
           <a:p>
             <a:fld id="{408CC927-4414-486E-A4EA-F55738DD0022}" type="datetimeFigureOut">
               <a:rPr lang="en-US" smtClean="0"/>
+              <a:pPr/>
               <a:t>4/30/2014</a:t>
             </a:fld>
             <a:endParaRPr lang="en-US" dirty="0"/>
@@ -2503,6 +2542,7 @@
           <a:p>
             <a:fld id="{A98AA4A0-CE78-441D-AF88-045EB62D3DB8}" type="slidenum">
               <a:rPr lang="en-US" smtClean="0"/>
+              <a:pPr/>
               <a:t>‹#›</a:t>
             </a:fld>
             <a:endParaRPr lang="en-US" dirty="0"/>
@@ -2669,6 +2709,7 @@
           <a:p>
             <a:fld id="{408CC927-4414-486E-A4EA-F55738DD0022}" type="datetimeFigureOut">
               <a:rPr lang="en-US" smtClean="0"/>
+              <a:pPr/>
               <a:t>4/30/2014</a:t>
             </a:fld>
             <a:endParaRPr lang="en-US" dirty="0"/>
@@ -2747,6 +2788,7 @@
           <a:p>
             <a:fld id="{A98AA4A0-CE78-441D-AF88-045EB62D3DB8}" type="slidenum">
               <a:rPr lang="en-US" smtClean="0"/>
+              <a:pPr/>
               <a:t>‹#›</a:t>
             </a:fld>
             <a:endParaRPr lang="en-US" dirty="0"/>
@@ -3095,6 +3137,792 @@
 </p:sld>
 </file>
 
+<file path=ppt/slides/slide10.xml><?xml version="1.0" encoding="utf-8"?>
+<p:sld xmlns:a="http://schemas.openxmlformats.org/drawingml/2006/main" xmlns:r="http://schemas.openxmlformats.org/officeDocument/2006/relationships" xmlns:p="http://schemas.openxmlformats.org/presentationml/2006/main">
+  <p:cSld>
+    <p:spTree>
+      <p:nvGrpSpPr>
+        <p:cNvPr id="1" name=""/>
+        <p:cNvGrpSpPr/>
+        <p:nvPr/>
+      </p:nvGrpSpPr>
+      <p:grpSpPr>
+        <a:xfrm>
+          <a:off x="0" y="0"/>
+          <a:ext cx="0" cy="0"/>
+          <a:chOff x="0" y="0"/>
+          <a:chExt cx="0" cy="0"/>
+        </a:xfrm>
+      </p:grpSpPr>
+      <p:sp>
+        <p:nvSpPr>
+          <p:cNvPr id="2" name="Title 1"/>
+          <p:cNvSpPr>
+            <a:spLocks noGrp="1"/>
+          </p:cNvSpPr>
+          <p:nvPr>
+            <p:ph type="title"/>
+          </p:nvPr>
+        </p:nvSpPr>
+        <p:spPr/>
+        <p:txBody>
+          <a:bodyPr/>
+          <a:lstStyle/>
+          <a:p>
+            <a:endParaRPr lang="en-US"/>
+          </a:p>
+        </p:txBody>
+      </p:sp>
+      <p:sp>
+        <p:nvSpPr>
+          <p:cNvPr id="3" name="Content Placeholder 2"/>
+          <p:cNvSpPr>
+            <a:spLocks noGrp="1"/>
+          </p:cNvSpPr>
+          <p:nvPr>
+            <p:ph idx="1"/>
+          </p:nvPr>
+        </p:nvSpPr>
+        <p:spPr/>
+        <p:txBody>
+          <a:bodyPr/>
+          <a:lstStyle/>
+          <a:p>
+            <a:endParaRPr lang="en-US"/>
+          </a:p>
+        </p:txBody>
+      </p:sp>
+    </p:spTree>
+  </p:cSld>
+  <p:clrMapOvr>
+    <a:masterClrMapping/>
+  </p:clrMapOvr>
+</p:sld>
+</file>
+
+<file path=ppt/slides/slide11.xml><?xml version="1.0" encoding="utf-8"?>
+<p:sld xmlns:a="http://schemas.openxmlformats.org/drawingml/2006/main" xmlns:r="http://schemas.openxmlformats.org/officeDocument/2006/relationships" xmlns:p="http://schemas.openxmlformats.org/presentationml/2006/main">
+  <p:cSld>
+    <p:spTree>
+      <p:nvGrpSpPr>
+        <p:cNvPr id="1" name=""/>
+        <p:cNvGrpSpPr/>
+        <p:nvPr/>
+      </p:nvGrpSpPr>
+      <p:grpSpPr>
+        <a:xfrm>
+          <a:off x="0" y="0"/>
+          <a:ext cx="0" cy="0"/>
+          <a:chOff x="0" y="0"/>
+          <a:chExt cx="0" cy="0"/>
+        </a:xfrm>
+      </p:grpSpPr>
+      <p:sp>
+        <p:nvSpPr>
+          <p:cNvPr id="2" name="Title 1"/>
+          <p:cNvSpPr>
+            <a:spLocks noGrp="1"/>
+          </p:cNvSpPr>
+          <p:nvPr>
+            <p:ph type="title"/>
+          </p:nvPr>
+        </p:nvSpPr>
+        <p:spPr/>
+        <p:txBody>
+          <a:bodyPr/>
+          <a:lstStyle/>
+          <a:p>
+            <a:r>
+              <a:rPr lang="en-US" dirty="0" smtClean="0"/>
+              <a:t>3D Panel Method</a:t>
+            </a:r>
+            <a:endParaRPr lang="en-US" dirty="0"/>
+          </a:p>
+        </p:txBody>
+      </p:sp>
+      <p:sp>
+        <p:nvSpPr>
+          <p:cNvPr id="3" name="Content Placeholder 2"/>
+          <p:cNvSpPr>
+            <a:spLocks noGrp="1"/>
+          </p:cNvSpPr>
+          <p:nvPr>
+            <p:ph idx="1"/>
+          </p:nvPr>
+        </p:nvSpPr>
+        <p:spPr/>
+        <p:txBody>
+          <a:bodyPr/>
+          <a:lstStyle/>
+          <a:p>
+            <a:endParaRPr lang="en-US"/>
+          </a:p>
+        </p:txBody>
+      </p:sp>
+    </p:spTree>
+  </p:cSld>
+  <p:clrMapOvr>
+    <a:masterClrMapping/>
+  </p:clrMapOvr>
+</p:sld>
+</file>
+
+<file path=ppt/slides/slide12.xml><?xml version="1.0" encoding="utf-8"?>
+<p:sld xmlns:a="http://schemas.openxmlformats.org/drawingml/2006/main" xmlns:r="http://schemas.openxmlformats.org/officeDocument/2006/relationships" xmlns:p="http://schemas.openxmlformats.org/presentationml/2006/main">
+  <p:cSld>
+    <p:spTree>
+      <p:nvGrpSpPr>
+        <p:cNvPr id="1" name=""/>
+        <p:cNvGrpSpPr/>
+        <p:nvPr/>
+      </p:nvGrpSpPr>
+      <p:grpSpPr>
+        <a:xfrm>
+          <a:off x="0" y="0"/>
+          <a:ext cx="0" cy="0"/>
+          <a:chOff x="0" y="0"/>
+          <a:chExt cx="0" cy="0"/>
+        </a:xfrm>
+      </p:grpSpPr>
+      <p:sp>
+        <p:nvSpPr>
+          <p:cNvPr id="2" name="Title 1"/>
+          <p:cNvSpPr>
+            <a:spLocks noGrp="1"/>
+          </p:cNvSpPr>
+          <p:nvPr>
+            <p:ph type="title"/>
+          </p:nvPr>
+        </p:nvSpPr>
+        <p:spPr/>
+        <p:txBody>
+          <a:bodyPr/>
+          <a:lstStyle/>
+          <a:p>
+            <a:endParaRPr lang="en-US"/>
+          </a:p>
+        </p:txBody>
+      </p:sp>
+      <p:pic>
+        <p:nvPicPr>
+          <p:cNvPr id="4" name="Content Placeholder 3" descr="compare.PNG"/>
+          <p:cNvPicPr>
+            <a:picLocks noGrp="1" noChangeAspect="1"/>
+          </p:cNvPicPr>
+          <p:nvPr>
+            <p:ph idx="1"/>
+          </p:nvPr>
+        </p:nvPicPr>
+        <p:blipFill>
+          <a:blip r:embed="rId2" cstate="print"/>
+          <a:stretch>
+            <a:fillRect/>
+          </a:stretch>
+        </p:blipFill>
+        <p:spPr>
+          <a:xfrm>
+            <a:off x="152400" y="2133600"/>
+            <a:ext cx="8893813" cy="3729880"/>
+          </a:xfrm>
+        </p:spPr>
+      </p:pic>
+    </p:spTree>
+  </p:cSld>
+  <p:clrMapOvr>
+    <a:masterClrMapping/>
+  </p:clrMapOvr>
+</p:sld>
+</file>
+
+<file path=ppt/slides/slide13.xml><?xml version="1.0" encoding="utf-8"?>
+<p:sld xmlns:a="http://schemas.openxmlformats.org/drawingml/2006/main" xmlns:r="http://schemas.openxmlformats.org/officeDocument/2006/relationships" xmlns:p="http://schemas.openxmlformats.org/presentationml/2006/main">
+  <p:cSld>
+    <p:spTree>
+      <p:nvGrpSpPr>
+        <p:cNvPr id="1" name=""/>
+        <p:cNvGrpSpPr/>
+        <p:nvPr/>
+      </p:nvGrpSpPr>
+      <p:grpSpPr>
+        <a:xfrm>
+          <a:off x="0" y="0"/>
+          <a:ext cx="0" cy="0"/>
+          <a:chOff x="0" y="0"/>
+          <a:chExt cx="0" cy="0"/>
+        </a:xfrm>
+      </p:grpSpPr>
+      <p:sp>
+        <p:nvSpPr>
+          <p:cNvPr id="2" name="Title 1"/>
+          <p:cNvSpPr>
+            <a:spLocks noGrp="1"/>
+          </p:cNvSpPr>
+          <p:nvPr>
+            <p:ph type="title"/>
+          </p:nvPr>
+        </p:nvSpPr>
+        <p:spPr/>
+        <p:txBody>
+          <a:bodyPr/>
+          <a:lstStyle/>
+          <a:p>
+            <a:endParaRPr lang="en-US"/>
+          </a:p>
+        </p:txBody>
+      </p:sp>
+      <p:pic>
+        <p:nvPicPr>
+          <p:cNvPr id="6" name="Content Placeholder 5" descr="LLT.PNG"/>
+          <p:cNvPicPr>
+            <a:picLocks noGrp="1" noChangeAspect="1"/>
+          </p:cNvPicPr>
+          <p:nvPr>
+            <p:ph idx="1"/>
+          </p:nvPr>
+        </p:nvPicPr>
+        <p:blipFill>
+          <a:blip r:embed="rId2" cstate="print"/>
+          <a:stretch>
+            <a:fillRect/>
+          </a:stretch>
+        </p:blipFill>
+        <p:spPr>
+          <a:xfrm>
+            <a:off x="304800" y="2128347"/>
+            <a:ext cx="8382000" cy="3533922"/>
+          </a:xfrm>
+        </p:spPr>
+      </p:pic>
+    </p:spTree>
+  </p:cSld>
+  <p:clrMapOvr>
+    <a:masterClrMapping/>
+  </p:clrMapOvr>
+</p:sld>
+</file>
+
+<file path=ppt/slides/slide14.xml><?xml version="1.0" encoding="utf-8"?>
+<p:sld xmlns:a="http://schemas.openxmlformats.org/drawingml/2006/main" xmlns:r="http://schemas.openxmlformats.org/officeDocument/2006/relationships" xmlns:p="http://schemas.openxmlformats.org/presentationml/2006/main">
+  <p:cSld>
+    <p:spTree>
+      <p:nvGrpSpPr>
+        <p:cNvPr id="1" name=""/>
+        <p:cNvGrpSpPr/>
+        <p:nvPr/>
+      </p:nvGrpSpPr>
+      <p:grpSpPr>
+        <a:xfrm>
+          <a:off x="0" y="0"/>
+          <a:ext cx="0" cy="0"/>
+          <a:chOff x="0" y="0"/>
+          <a:chExt cx="0" cy="0"/>
+        </a:xfrm>
+      </p:grpSpPr>
+      <p:sp>
+        <p:nvSpPr>
+          <p:cNvPr id="2" name="Title 1"/>
+          <p:cNvSpPr>
+            <a:spLocks noGrp="1"/>
+          </p:cNvSpPr>
+          <p:nvPr>
+            <p:ph type="title"/>
+          </p:nvPr>
+        </p:nvSpPr>
+        <p:spPr/>
+        <p:txBody>
+          <a:bodyPr/>
+          <a:lstStyle/>
+          <a:p>
+            <a:endParaRPr lang="en-US"/>
+          </a:p>
+        </p:txBody>
+      </p:sp>
+      <p:pic>
+        <p:nvPicPr>
+          <p:cNvPr id="4" name="Content Placeholder 3" descr="RVLM2.PNG"/>
+          <p:cNvPicPr>
+            <a:picLocks noGrp="1" noChangeAspect="1"/>
+          </p:cNvPicPr>
+          <p:nvPr>
+            <p:ph idx="1"/>
+          </p:nvPr>
+        </p:nvPicPr>
+        <p:blipFill>
+          <a:blip r:embed="rId2" cstate="print"/>
+          <a:stretch>
+            <a:fillRect/>
+          </a:stretch>
+        </p:blipFill>
+        <p:spPr>
+          <a:xfrm>
+            <a:off x="381000" y="2114565"/>
+            <a:ext cx="8305800" cy="3529615"/>
+          </a:xfrm>
+        </p:spPr>
+      </p:pic>
+    </p:spTree>
+  </p:cSld>
+  <p:clrMapOvr>
+    <a:masterClrMapping/>
+  </p:clrMapOvr>
+</p:sld>
+</file>
+
+<file path=ppt/slides/slide15.xml><?xml version="1.0" encoding="utf-8"?>
+<p:sld xmlns:a="http://schemas.openxmlformats.org/drawingml/2006/main" xmlns:r="http://schemas.openxmlformats.org/officeDocument/2006/relationships" xmlns:p="http://schemas.openxmlformats.org/presentationml/2006/main">
+  <p:cSld>
+    <p:spTree>
+      <p:nvGrpSpPr>
+        <p:cNvPr id="1" name=""/>
+        <p:cNvGrpSpPr/>
+        <p:nvPr/>
+      </p:nvGrpSpPr>
+      <p:grpSpPr>
+        <a:xfrm>
+          <a:off x="0" y="0"/>
+          <a:ext cx="0" cy="0"/>
+          <a:chOff x="0" y="0"/>
+          <a:chExt cx="0" cy="0"/>
+        </a:xfrm>
+      </p:grpSpPr>
+      <p:sp>
+        <p:nvSpPr>
+          <p:cNvPr id="2" name="Title 1"/>
+          <p:cNvSpPr>
+            <a:spLocks noGrp="1"/>
+          </p:cNvSpPr>
+          <p:nvPr>
+            <p:ph type="title"/>
+          </p:nvPr>
+        </p:nvSpPr>
+        <p:spPr/>
+        <p:txBody>
+          <a:bodyPr/>
+          <a:lstStyle/>
+          <a:p>
+            <a:endParaRPr lang="en-US"/>
+          </a:p>
+        </p:txBody>
+      </p:sp>
+      <p:pic>
+        <p:nvPicPr>
+          <p:cNvPr id="4" name="Content Placeholder 3" descr="Panel.PNG"/>
+          <p:cNvPicPr>
+            <a:picLocks noGrp="1" noChangeAspect="1"/>
+          </p:cNvPicPr>
+          <p:nvPr>
+            <p:ph idx="1"/>
+          </p:nvPr>
+        </p:nvPicPr>
+        <p:blipFill>
+          <a:blip r:embed="rId2" cstate="print"/>
+          <a:stretch>
+            <a:fillRect/>
+          </a:stretch>
+        </p:blipFill>
+        <p:spPr>
+          <a:xfrm>
+            <a:off x="457200" y="2128347"/>
+            <a:ext cx="8229600" cy="3469669"/>
+          </a:xfrm>
+        </p:spPr>
+      </p:pic>
+    </p:spTree>
+  </p:cSld>
+  <p:clrMapOvr>
+    <a:masterClrMapping/>
+  </p:clrMapOvr>
+</p:sld>
+</file>
+
+<file path=ppt/slides/slide16.xml><?xml version="1.0" encoding="utf-8"?>
+<p:sld xmlns:a="http://schemas.openxmlformats.org/drawingml/2006/main" xmlns:r="http://schemas.openxmlformats.org/officeDocument/2006/relationships" xmlns:p="http://schemas.openxmlformats.org/presentationml/2006/main">
+  <p:cSld>
+    <p:spTree>
+      <p:nvGrpSpPr>
+        <p:cNvPr id="1" name=""/>
+        <p:cNvGrpSpPr/>
+        <p:nvPr/>
+      </p:nvGrpSpPr>
+      <p:grpSpPr>
+        <a:xfrm>
+          <a:off x="0" y="0"/>
+          <a:ext cx="0" cy="0"/>
+          <a:chOff x="0" y="0"/>
+          <a:chExt cx="0" cy="0"/>
+        </a:xfrm>
+      </p:grpSpPr>
+      <p:sp>
+        <p:nvSpPr>
+          <p:cNvPr id="2" name="Title 1"/>
+          <p:cNvSpPr>
+            <a:spLocks noGrp="1"/>
+          </p:cNvSpPr>
+          <p:nvPr>
+            <p:ph type="title"/>
+          </p:nvPr>
+        </p:nvSpPr>
+        <p:spPr/>
+        <p:txBody>
+          <a:bodyPr/>
+          <a:lstStyle/>
+          <a:p>
+            <a:endParaRPr lang="en-US" dirty="0"/>
+          </a:p>
+        </p:txBody>
+      </p:sp>
+      <p:pic>
+        <p:nvPicPr>
+          <p:cNvPr id="4" name="Content Placeholder 3" descr="bottompanel.png"/>
+          <p:cNvPicPr>
+            <a:picLocks noGrp="1" noChangeAspect="1"/>
+          </p:cNvPicPr>
+          <p:nvPr>
+            <p:ph idx="1"/>
+          </p:nvPr>
+        </p:nvPicPr>
+        <p:blipFill>
+          <a:blip r:embed="rId2" cstate="print"/>
+          <a:stretch>
+            <a:fillRect/>
+          </a:stretch>
+        </p:blipFill>
+        <p:spPr>
+          <a:xfrm>
+            <a:off x="533400" y="2057400"/>
+            <a:ext cx="3850105" cy="1828800"/>
+          </a:xfrm>
+        </p:spPr>
+      </p:pic>
+      <p:pic>
+        <p:nvPicPr>
+          <p:cNvPr id="5" name="Picture 4" descr="toppanel.png"/>
+          <p:cNvPicPr>
+            <a:picLocks noChangeAspect="1"/>
+          </p:cNvPicPr>
+          <p:nvPr/>
+        </p:nvPicPr>
+        <p:blipFill>
+          <a:blip r:embed="rId3" cstate="print"/>
+          <a:stretch>
+            <a:fillRect/>
+          </a:stretch>
+        </p:blipFill>
+        <p:spPr>
+          <a:xfrm>
+            <a:off x="4800601" y="2057400"/>
+            <a:ext cx="3850105" cy="1828800"/>
+          </a:xfrm>
+          <a:prstGeom prst="rect">
+            <a:avLst/>
+          </a:prstGeom>
+        </p:spPr>
+      </p:pic>
+      <p:pic>
+        <p:nvPicPr>
+          <p:cNvPr id="6" name="Picture 5" descr="bottomvlm.png"/>
+          <p:cNvPicPr>
+            <a:picLocks noChangeAspect="1"/>
+          </p:cNvPicPr>
+          <p:nvPr/>
+        </p:nvPicPr>
+        <p:blipFill>
+          <a:blip r:embed="rId4" cstate="print"/>
+          <a:stretch>
+            <a:fillRect/>
+          </a:stretch>
+        </p:blipFill>
+        <p:spPr>
+          <a:xfrm>
+            <a:off x="533399" y="4419600"/>
+            <a:ext cx="3850105" cy="1828800"/>
+          </a:xfrm>
+          <a:prstGeom prst="rect">
+            <a:avLst/>
+          </a:prstGeom>
+        </p:spPr>
+      </p:pic>
+      <p:pic>
+        <p:nvPicPr>
+          <p:cNvPr id="7" name="Picture 6" descr="topvlm.png"/>
+          <p:cNvPicPr>
+            <a:picLocks noChangeAspect="1"/>
+          </p:cNvPicPr>
+          <p:nvPr/>
+        </p:nvPicPr>
+        <p:blipFill>
+          <a:blip r:embed="rId5" cstate="print"/>
+          <a:stretch>
+            <a:fillRect/>
+          </a:stretch>
+        </p:blipFill>
+        <p:spPr>
+          <a:xfrm>
+            <a:off x="4724400" y="4419600"/>
+            <a:ext cx="3850106" cy="1828800"/>
+          </a:xfrm>
+          <a:prstGeom prst="rect">
+            <a:avLst/>
+          </a:prstGeom>
+        </p:spPr>
+      </p:pic>
+      <p:sp>
+        <p:nvSpPr>
+          <p:cNvPr id="8" name="TextBox 7"/>
+          <p:cNvSpPr txBox="1"/>
+          <p:nvPr/>
+        </p:nvSpPr>
+        <p:spPr>
+          <a:xfrm>
+            <a:off x="4038600" y="1524000"/>
+            <a:ext cx="4343400" cy="369332"/>
+          </a:xfrm>
+          <a:prstGeom prst="rect">
+            <a:avLst/>
+          </a:prstGeom>
+          <a:noFill/>
+        </p:spPr>
+        <p:txBody>
+          <a:bodyPr wrap="square" rtlCol="0">
+            <a:spAutoFit/>
+          </a:bodyPr>
+          <a:lstStyle/>
+          <a:p>
+            <a:r>
+              <a:rPr lang="en-US" dirty="0" smtClean="0"/>
+              <a:t>3D Panel</a:t>
+            </a:r>
+            <a:endParaRPr lang="en-US" dirty="0"/>
+          </a:p>
+        </p:txBody>
+      </p:sp>
+      <p:sp>
+        <p:nvSpPr>
+          <p:cNvPr id="9" name="TextBox 8"/>
+          <p:cNvSpPr txBox="1"/>
+          <p:nvPr/>
+        </p:nvSpPr>
+        <p:spPr>
+          <a:xfrm>
+            <a:off x="4191000" y="3962400"/>
+            <a:ext cx="1447800" cy="369332"/>
+          </a:xfrm>
+          <a:prstGeom prst="rect">
+            <a:avLst/>
+          </a:prstGeom>
+          <a:noFill/>
+        </p:spPr>
+        <p:txBody>
+          <a:bodyPr wrap="square" rtlCol="0">
+            <a:spAutoFit/>
+          </a:bodyPr>
+          <a:lstStyle/>
+          <a:p>
+            <a:r>
+              <a:rPr lang="en-US" dirty="0" smtClean="0"/>
+              <a:t>VLM1</a:t>
+            </a:r>
+            <a:endParaRPr lang="en-US" dirty="0"/>
+          </a:p>
+        </p:txBody>
+      </p:sp>
+    </p:spTree>
+  </p:cSld>
+  <p:clrMapOvr>
+    <a:masterClrMapping/>
+  </p:clrMapOvr>
+</p:sld>
+</file>
+
+<file path=ppt/slides/slide17.xml><?xml version="1.0" encoding="utf-8"?>
+<p:sld xmlns:a="http://schemas.openxmlformats.org/drawingml/2006/main" xmlns:r="http://schemas.openxmlformats.org/officeDocument/2006/relationships" xmlns:p="http://schemas.openxmlformats.org/presentationml/2006/main">
+  <p:cSld>
+    <p:spTree>
+      <p:nvGrpSpPr>
+        <p:cNvPr id="1" name=""/>
+        <p:cNvGrpSpPr/>
+        <p:nvPr/>
+      </p:nvGrpSpPr>
+      <p:grpSpPr>
+        <a:xfrm>
+          <a:off x="0" y="0"/>
+          <a:ext cx="0" cy="0"/>
+          <a:chOff x="0" y="0"/>
+          <a:chExt cx="0" cy="0"/>
+        </a:xfrm>
+      </p:grpSpPr>
+      <p:sp>
+        <p:nvSpPr>
+          <p:cNvPr id="2" name="Title 1"/>
+          <p:cNvSpPr>
+            <a:spLocks noGrp="1"/>
+          </p:cNvSpPr>
+          <p:nvPr>
+            <p:ph type="title"/>
+          </p:nvPr>
+        </p:nvSpPr>
+        <p:spPr/>
+        <p:txBody>
+          <a:bodyPr/>
+          <a:lstStyle/>
+          <a:p>
+            <a:endParaRPr lang="en-US"/>
+          </a:p>
+        </p:txBody>
+      </p:sp>
+      <p:sp>
+        <p:nvSpPr>
+          <p:cNvPr id="3" name="Content Placeholder 2"/>
+          <p:cNvSpPr>
+            <a:spLocks noGrp="1"/>
+          </p:cNvSpPr>
+          <p:nvPr>
+            <p:ph idx="1"/>
+          </p:nvPr>
+        </p:nvSpPr>
+        <p:spPr/>
+        <p:txBody>
+          <a:bodyPr/>
+          <a:lstStyle/>
+          <a:p>
+            <a:endParaRPr lang="en-US"/>
+          </a:p>
+        </p:txBody>
+      </p:sp>
+    </p:spTree>
+  </p:cSld>
+  <p:clrMapOvr>
+    <a:masterClrMapping/>
+  </p:clrMapOvr>
+</p:sld>
+</file>
+
+<file path=ppt/slides/slide18.xml><?xml version="1.0" encoding="utf-8"?>
+<p:sld xmlns:a="http://schemas.openxmlformats.org/drawingml/2006/main" xmlns:r="http://schemas.openxmlformats.org/officeDocument/2006/relationships" xmlns:p="http://schemas.openxmlformats.org/presentationml/2006/main">
+  <p:cSld>
+    <p:spTree>
+      <p:nvGrpSpPr>
+        <p:cNvPr id="1" name=""/>
+        <p:cNvGrpSpPr/>
+        <p:nvPr/>
+      </p:nvGrpSpPr>
+      <p:grpSpPr>
+        <a:xfrm>
+          <a:off x="0" y="0"/>
+          <a:ext cx="0" cy="0"/>
+          <a:chOff x="0" y="0"/>
+          <a:chExt cx="0" cy="0"/>
+        </a:xfrm>
+      </p:grpSpPr>
+      <p:sp>
+        <p:nvSpPr>
+          <p:cNvPr id="2" name="Title 1"/>
+          <p:cNvSpPr>
+            <a:spLocks noGrp="1"/>
+          </p:cNvSpPr>
+          <p:nvPr>
+            <p:ph type="title"/>
+          </p:nvPr>
+        </p:nvSpPr>
+        <p:spPr/>
+        <p:txBody>
+          <a:bodyPr/>
+          <a:lstStyle/>
+          <a:p>
+            <a:endParaRPr lang="en-US"/>
+          </a:p>
+        </p:txBody>
+      </p:sp>
+      <p:sp>
+        <p:nvSpPr>
+          <p:cNvPr id="3" name="Content Placeholder 2"/>
+          <p:cNvSpPr>
+            <a:spLocks noGrp="1"/>
+          </p:cNvSpPr>
+          <p:nvPr>
+            <p:ph idx="1"/>
+          </p:nvPr>
+        </p:nvSpPr>
+        <p:spPr/>
+        <p:txBody>
+          <a:bodyPr/>
+          <a:lstStyle/>
+          <a:p>
+            <a:endParaRPr lang="en-US"/>
+          </a:p>
+        </p:txBody>
+      </p:sp>
+    </p:spTree>
+  </p:cSld>
+  <p:clrMapOvr>
+    <a:masterClrMapping/>
+  </p:clrMapOvr>
+</p:sld>
+</file>
+
+<file path=ppt/slides/slide19.xml><?xml version="1.0" encoding="utf-8"?>
+<p:sld xmlns:a="http://schemas.openxmlformats.org/drawingml/2006/main" xmlns:r="http://schemas.openxmlformats.org/officeDocument/2006/relationships" xmlns:p="http://schemas.openxmlformats.org/presentationml/2006/main">
+  <p:cSld>
+    <p:spTree>
+      <p:nvGrpSpPr>
+        <p:cNvPr id="1" name=""/>
+        <p:cNvGrpSpPr/>
+        <p:nvPr/>
+      </p:nvGrpSpPr>
+      <p:grpSpPr>
+        <a:xfrm>
+          <a:off x="0" y="0"/>
+          <a:ext cx="0" cy="0"/>
+          <a:chOff x="0" y="0"/>
+          <a:chExt cx="0" cy="0"/>
+        </a:xfrm>
+      </p:grpSpPr>
+      <p:sp>
+        <p:nvSpPr>
+          <p:cNvPr id="2" name="Title 1"/>
+          <p:cNvSpPr>
+            <a:spLocks noGrp="1"/>
+          </p:cNvSpPr>
+          <p:nvPr>
+            <p:ph type="title"/>
+          </p:nvPr>
+        </p:nvSpPr>
+        <p:spPr/>
+        <p:txBody>
+          <a:bodyPr/>
+          <a:lstStyle/>
+          <a:p>
+            <a:endParaRPr lang="en-US"/>
+          </a:p>
+        </p:txBody>
+      </p:sp>
+      <p:sp>
+        <p:nvSpPr>
+          <p:cNvPr id="3" name="Content Placeholder 2"/>
+          <p:cNvSpPr>
+            <a:spLocks noGrp="1"/>
+          </p:cNvSpPr>
+          <p:nvPr>
+            <p:ph idx="1"/>
+          </p:nvPr>
+        </p:nvSpPr>
+        <p:spPr/>
+        <p:txBody>
+          <a:bodyPr/>
+          <a:lstStyle/>
+          <a:p>
+            <a:endParaRPr lang="en-US"/>
+          </a:p>
+        </p:txBody>
+      </p:sp>
+    </p:spTree>
+  </p:cSld>
+  <p:clrMapOvr>
+    <a:masterClrMapping/>
+  </p:clrMapOvr>
+</p:sld>
+</file>
+
 <file path=ppt/slides/slide2.xml><?xml version="1.0" encoding="utf-8"?>
 <p:sld xmlns:a="http://schemas.openxmlformats.org/drawingml/2006/main" xmlns:r="http://schemas.openxmlformats.org/officeDocument/2006/relationships" xmlns:p="http://schemas.openxmlformats.org/presentationml/2006/main">
   <p:cSld>
@@ -3158,6 +3986,73 @@
           </a:xfrm>
         </p:spPr>
       </p:pic>
+    </p:spTree>
+  </p:cSld>
+  <p:clrMapOvr>
+    <a:masterClrMapping/>
+  </p:clrMapOvr>
+</p:sld>
+</file>
+
+<file path=ppt/slides/slide20.xml><?xml version="1.0" encoding="utf-8"?>
+<p:sld xmlns:a="http://schemas.openxmlformats.org/drawingml/2006/main" xmlns:r="http://schemas.openxmlformats.org/officeDocument/2006/relationships" xmlns:p="http://schemas.openxmlformats.org/presentationml/2006/main">
+  <p:cSld>
+    <p:spTree>
+      <p:nvGrpSpPr>
+        <p:cNvPr id="1" name=""/>
+        <p:cNvGrpSpPr/>
+        <p:nvPr/>
+      </p:nvGrpSpPr>
+      <p:grpSpPr>
+        <a:xfrm>
+          <a:off x="0" y="0"/>
+          <a:ext cx="0" cy="0"/>
+          <a:chOff x="0" y="0"/>
+          <a:chExt cx="0" cy="0"/>
+        </a:xfrm>
+      </p:grpSpPr>
+      <p:sp>
+        <p:nvSpPr>
+          <p:cNvPr id="2" name="Title 1"/>
+          <p:cNvSpPr>
+            <a:spLocks noGrp="1"/>
+          </p:cNvSpPr>
+          <p:nvPr>
+            <p:ph type="title"/>
+          </p:nvPr>
+        </p:nvSpPr>
+        <p:spPr/>
+        <p:txBody>
+          <a:bodyPr/>
+          <a:lstStyle/>
+          <a:p>
+            <a:r>
+              <a:rPr lang="en-US" dirty="0" smtClean="0"/>
+              <a:t>Question?</a:t>
+            </a:r>
+            <a:endParaRPr lang="en-US" dirty="0"/>
+          </a:p>
+        </p:txBody>
+      </p:sp>
+      <p:sp>
+        <p:nvSpPr>
+          <p:cNvPr id="3" name="Content Placeholder 2"/>
+          <p:cNvSpPr>
+            <a:spLocks noGrp="1"/>
+          </p:cNvSpPr>
+          <p:nvPr>
+            <p:ph idx="1"/>
+          </p:nvPr>
+        </p:nvSpPr>
+        <p:spPr/>
+        <p:txBody>
+          <a:bodyPr/>
+          <a:lstStyle/>
+          <a:p>
+            <a:endParaRPr lang="en-US" dirty="0"/>
+          </a:p>
+        </p:txBody>
+      </p:sp>
     </p:spTree>
   </p:cSld>
   <p:clrMapOvr>
@@ -3325,12 +4220,352 @@
           <a:chExt cx="0" cy="0"/>
         </a:xfrm>
       </p:grpSpPr>
+      <p:sp>
+        <p:nvSpPr>
+          <p:cNvPr id="2" name="Title 1"/>
+          <p:cNvSpPr>
+            <a:spLocks noGrp="1"/>
+          </p:cNvSpPr>
+          <p:nvPr>
+            <p:ph type="title"/>
+          </p:nvPr>
+        </p:nvSpPr>
+        <p:spPr/>
+        <p:txBody>
+          <a:bodyPr/>
+          <a:lstStyle/>
+          <a:p>
+            <a:r>
+              <a:rPr lang="en-US" dirty="0" smtClean="0"/>
+              <a:t>LLT Lifting Line Theory</a:t>
+            </a:r>
+            <a:endParaRPr lang="en-US" dirty="0"/>
+          </a:p>
+        </p:txBody>
+      </p:sp>
+      <p:pic>
+        <p:nvPicPr>
+          <p:cNvPr id="4" name="Content Placeholder 3" descr="800px-Lifting_line_theory_illustration_(2).svg.png"/>
+          <p:cNvPicPr>
+            <a:picLocks noGrp="1" noChangeAspect="1"/>
+          </p:cNvPicPr>
+          <p:nvPr>
+            <p:ph sz="half" idx="1"/>
+          </p:nvPr>
+        </p:nvPicPr>
+        <p:blipFill>
+          <a:blip r:embed="rId2" cstate="print"/>
+          <a:stretch>
+            <a:fillRect/>
+          </a:stretch>
+        </p:blipFill>
+        <p:spPr>
+          <a:xfrm>
+            <a:off x="4114800" y="1676400"/>
+            <a:ext cx="4800600" cy="3594450"/>
+          </a:xfrm>
+        </p:spPr>
+      </p:pic>
+      <p:sp>
+        <p:nvSpPr>
+          <p:cNvPr id="5" name="Content Placeholder 4"/>
+          <p:cNvSpPr>
+            <a:spLocks noGrp="1"/>
+          </p:cNvSpPr>
+          <p:nvPr>
+            <p:ph sz="half" idx="2"/>
+          </p:nvPr>
+        </p:nvSpPr>
+        <p:spPr>
+          <a:xfrm>
+            <a:off x="609600" y="1600200"/>
+            <a:ext cx="4038600" cy="4525963"/>
+          </a:xfrm>
+        </p:spPr>
+        <p:txBody>
+          <a:bodyPr/>
+          <a:lstStyle/>
+          <a:p>
+            <a:endParaRPr lang="en-US" dirty="0"/>
+          </a:p>
+        </p:txBody>
+      </p:sp>
     </p:spTree>
   </p:cSld>
   <p:clrMapOvr>
     <a:masterClrMapping/>
   </p:clrMapOvr>
 </p:sld>
+</file>
+
+<file path=ppt/slides/slide6.xml><?xml version="1.0" encoding="utf-8"?>
+<p:sld xmlns:a="http://schemas.openxmlformats.org/drawingml/2006/main" xmlns:r="http://schemas.openxmlformats.org/officeDocument/2006/relationships" xmlns:p="http://schemas.openxmlformats.org/presentationml/2006/main">
+  <p:cSld>
+    <p:spTree>
+      <p:nvGrpSpPr>
+        <p:cNvPr id="1" name=""/>
+        <p:cNvGrpSpPr/>
+        <p:nvPr/>
+      </p:nvGrpSpPr>
+      <p:grpSpPr>
+        <a:xfrm>
+          <a:off x="0" y="0"/>
+          <a:ext cx="0" cy="0"/>
+          <a:chOff x="0" y="0"/>
+          <a:chExt cx="0" cy="0"/>
+        </a:xfrm>
+      </p:grpSpPr>
+      <p:sp>
+        <p:nvSpPr>
+          <p:cNvPr id="2" name="Title 1"/>
+          <p:cNvSpPr>
+            <a:spLocks noGrp="1"/>
+          </p:cNvSpPr>
+          <p:nvPr>
+            <p:ph type="title"/>
+          </p:nvPr>
+        </p:nvSpPr>
+        <p:spPr/>
+        <p:txBody>
+          <a:bodyPr/>
+          <a:lstStyle/>
+          <a:p>
+            <a:r>
+              <a:rPr lang="en-US" dirty="0" smtClean="0"/>
+              <a:t>VLM Vortex Lattice Method</a:t>
+            </a:r>
+            <a:endParaRPr lang="en-US" dirty="0"/>
+          </a:p>
+        </p:txBody>
+      </p:sp>
+      <p:sp>
+        <p:nvSpPr>
+          <p:cNvPr id="3" name="Content Placeholder 2"/>
+          <p:cNvSpPr>
+            <a:spLocks noGrp="1"/>
+          </p:cNvSpPr>
+          <p:nvPr>
+            <p:ph idx="1"/>
+          </p:nvPr>
+        </p:nvSpPr>
+        <p:spPr/>
+        <p:txBody>
+          <a:bodyPr/>
+          <a:lstStyle/>
+          <a:p>
+            <a:endParaRPr lang="en-US"/>
+          </a:p>
+        </p:txBody>
+      </p:sp>
+    </p:spTree>
+  </p:cSld>
+  <p:clrMapOvr>
+    <a:masterClrMapping/>
+  </p:clrMapOvr>
+</p:sld>
+</file>
+
+<file path=ppt/slides/slide7.xml><?xml version="1.0" encoding="utf-8"?>
+<p:sld xmlns:a="http://schemas.openxmlformats.org/drawingml/2006/main" xmlns:r="http://schemas.openxmlformats.org/officeDocument/2006/relationships" xmlns:p="http://schemas.openxmlformats.org/presentationml/2006/main">
+  <p:cSld>
+    <p:spTree>
+      <p:nvGrpSpPr>
+        <p:cNvPr id="1" name=""/>
+        <p:cNvGrpSpPr/>
+        <p:nvPr/>
+      </p:nvGrpSpPr>
+      <p:grpSpPr>
+        <a:xfrm>
+          <a:off x="0" y="0"/>
+          <a:ext cx="0" cy="0"/>
+          <a:chOff x="0" y="0"/>
+          <a:chExt cx="0" cy="0"/>
+        </a:xfrm>
+      </p:grpSpPr>
+      <p:sp>
+        <p:nvSpPr>
+          <p:cNvPr id="2" name="Title 1"/>
+          <p:cNvSpPr>
+            <a:spLocks noGrp="1"/>
+          </p:cNvSpPr>
+          <p:nvPr>
+            <p:ph type="title"/>
+          </p:nvPr>
+        </p:nvSpPr>
+        <p:spPr/>
+        <p:txBody>
+          <a:bodyPr/>
+          <a:lstStyle/>
+          <a:p>
+            <a:r>
+              <a:rPr lang="en-US" dirty="0" smtClean="0"/>
+              <a:t>VLM 1</a:t>
+            </a:r>
+            <a:endParaRPr lang="en-US" dirty="0"/>
+          </a:p>
+        </p:txBody>
+      </p:sp>
+      <p:sp>
+        <p:nvSpPr>
+          <p:cNvPr id="3" name="Content Placeholder 2"/>
+          <p:cNvSpPr>
+            <a:spLocks noGrp="1"/>
+          </p:cNvSpPr>
+          <p:nvPr>
+            <p:ph idx="1"/>
+          </p:nvPr>
+        </p:nvSpPr>
+        <p:spPr/>
+        <p:txBody>
+          <a:bodyPr/>
+          <a:lstStyle/>
+          <a:p>
+            <a:endParaRPr lang="en-US"/>
+          </a:p>
+        </p:txBody>
+      </p:sp>
+    </p:spTree>
+  </p:cSld>
+  <p:clrMapOvr>
+    <a:masterClrMapping/>
+  </p:clrMapOvr>
+</p:sld>
+</file>
+
+<file path=ppt/slides/slide8.xml><?xml version="1.0" encoding="utf-8"?>
+<p:sld xmlns:a="http://schemas.openxmlformats.org/drawingml/2006/main" xmlns:r="http://schemas.openxmlformats.org/officeDocument/2006/relationships" xmlns:p="http://schemas.openxmlformats.org/presentationml/2006/main">
+  <p:cSld>
+    <p:spTree>
+      <p:nvGrpSpPr>
+        <p:cNvPr id="1" name=""/>
+        <p:cNvGrpSpPr/>
+        <p:nvPr/>
+      </p:nvGrpSpPr>
+      <p:grpSpPr>
+        <a:xfrm>
+          <a:off x="0" y="0"/>
+          <a:ext cx="0" cy="0"/>
+          <a:chOff x="0" y="0"/>
+          <a:chExt cx="0" cy="0"/>
+        </a:xfrm>
+      </p:grpSpPr>
+      <p:sp>
+        <p:nvSpPr>
+          <p:cNvPr id="2" name="Title 1"/>
+          <p:cNvSpPr>
+            <a:spLocks noGrp="1"/>
+          </p:cNvSpPr>
+          <p:nvPr>
+            <p:ph type="title"/>
+          </p:nvPr>
+        </p:nvSpPr>
+        <p:spPr/>
+        <p:txBody>
+          <a:bodyPr/>
+          <a:lstStyle/>
+          <a:p>
+            <a:endParaRPr lang="en-US"/>
+          </a:p>
+        </p:txBody>
+      </p:sp>
+      <p:sp>
+        <p:nvSpPr>
+          <p:cNvPr id="3" name="Content Placeholder 2"/>
+          <p:cNvSpPr>
+            <a:spLocks noGrp="1"/>
+          </p:cNvSpPr>
+          <p:nvPr>
+            <p:ph idx="1"/>
+          </p:nvPr>
+        </p:nvSpPr>
+        <p:spPr/>
+        <p:txBody>
+          <a:bodyPr/>
+          <a:lstStyle/>
+          <a:p>
+            <a:endParaRPr lang="en-US"/>
+          </a:p>
+        </p:txBody>
+      </p:sp>
+    </p:spTree>
+  </p:cSld>
+  <p:clrMapOvr>
+    <a:masterClrMapping/>
+  </p:clrMapOvr>
+</p:sld>
+</file>
+
+<file path=ppt/slides/slide9.xml><?xml version="1.0" encoding="utf-8"?>
+<p:sld xmlns:a="http://schemas.openxmlformats.org/drawingml/2006/main" xmlns:r="http://schemas.openxmlformats.org/officeDocument/2006/relationships" xmlns:p="http://schemas.openxmlformats.org/presentationml/2006/main">
+  <p:cSld>
+    <p:spTree>
+      <p:nvGrpSpPr>
+        <p:cNvPr id="1" name=""/>
+        <p:cNvGrpSpPr/>
+        <p:nvPr/>
+      </p:nvGrpSpPr>
+      <p:grpSpPr>
+        <a:xfrm>
+          <a:off x="0" y="0"/>
+          <a:ext cx="0" cy="0"/>
+          <a:chOff x="0" y="0"/>
+          <a:chExt cx="0" cy="0"/>
+        </a:xfrm>
+      </p:grpSpPr>
+      <p:sp>
+        <p:nvSpPr>
+          <p:cNvPr id="2" name="Title 1"/>
+          <p:cNvSpPr>
+            <a:spLocks noGrp="1"/>
+          </p:cNvSpPr>
+          <p:nvPr>
+            <p:ph type="title"/>
+          </p:nvPr>
+        </p:nvSpPr>
+        <p:spPr/>
+        <p:txBody>
+          <a:bodyPr/>
+          <a:lstStyle/>
+          <a:p>
+            <a:r>
+              <a:rPr lang="en-US" dirty="0" smtClean="0"/>
+              <a:t>VLM2</a:t>
+            </a:r>
+            <a:endParaRPr lang="en-US" dirty="0"/>
+          </a:p>
+        </p:txBody>
+      </p:sp>
+      <p:sp>
+        <p:nvSpPr>
+          <p:cNvPr id="3" name="Content Placeholder 2"/>
+          <p:cNvSpPr>
+            <a:spLocks noGrp="1"/>
+          </p:cNvSpPr>
+          <p:nvPr>
+            <p:ph idx="1"/>
+          </p:nvPr>
+        </p:nvSpPr>
+        <p:spPr/>
+        <p:txBody>
+          <a:bodyPr/>
+          <a:lstStyle/>
+          <a:p>
+            <a:endParaRPr lang="en-US"/>
+          </a:p>
+        </p:txBody>
+      </p:sp>
+    </p:spTree>
+  </p:cSld>
+  <p:clrMapOvr>
+    <a:masterClrMapping/>
+  </p:clrMapOvr>
+</p:sld>
+</file>
+
+<file path=ppt/tags/tag1.xml><?xml version="1.0" encoding="utf-8"?>
+<p:tagLst xmlns:a="http://schemas.openxmlformats.org/drawingml/2006/main" xmlns:r="http://schemas.openxmlformats.org/officeDocument/2006/relationships" xmlns:p="http://schemas.openxmlformats.org/presentationml/2006/main">
+  <p:tag name="FIRSTCOLIN@QJHCBVMRBBBJERT4" val="5233"/>
+</p:tagLst>
 </file>
 
 <file path=ppt/theme/theme1.xml><?xml version="1.0" encoding="utf-8"?>

</xml_diff>

<commit_message>
Everything "complete" needs editing
</commit_message>
<xml_diff>
--- a/XFLR5 Methods and Their Application in.pptx
+++ b/XFLR5 Methods and Their Application in.pptx
@@ -6,29 +6,31 @@
   </p:sldMasterIdLst>
   <p:sldIdLst>
     <p:sldId id="256" r:id="rId2"/>
-    <p:sldId id="257" r:id="rId3"/>
-    <p:sldId id="258" r:id="rId4"/>
-    <p:sldId id="259" r:id="rId5"/>
-    <p:sldId id="260" r:id="rId6"/>
-    <p:sldId id="279" r:id="rId7"/>
-    <p:sldId id="261" r:id="rId8"/>
-    <p:sldId id="263" r:id="rId9"/>
-    <p:sldId id="262" r:id="rId10"/>
-    <p:sldId id="277" r:id="rId11"/>
-    <p:sldId id="264" r:id="rId12"/>
-    <p:sldId id="265" r:id="rId13"/>
-    <p:sldId id="266" r:id="rId14"/>
-    <p:sldId id="267" r:id="rId15"/>
-    <p:sldId id="268" r:id="rId16"/>
-    <p:sldId id="278" r:id="rId17"/>
-    <p:sldId id="269" r:id="rId18"/>
-    <p:sldId id="271" r:id="rId19"/>
-    <p:sldId id="275" r:id="rId20"/>
+    <p:sldId id="282" r:id="rId3"/>
+    <p:sldId id="257" r:id="rId4"/>
+    <p:sldId id="258" r:id="rId5"/>
+    <p:sldId id="259" r:id="rId6"/>
+    <p:sldId id="283" r:id="rId7"/>
+    <p:sldId id="260" r:id="rId8"/>
+    <p:sldId id="279" r:id="rId9"/>
+    <p:sldId id="261" r:id="rId10"/>
+    <p:sldId id="263" r:id="rId11"/>
+    <p:sldId id="262" r:id="rId12"/>
+    <p:sldId id="264" r:id="rId13"/>
+    <p:sldId id="281" r:id="rId14"/>
+    <p:sldId id="265" r:id="rId15"/>
+    <p:sldId id="266" r:id="rId16"/>
+    <p:sldId id="267" r:id="rId17"/>
+    <p:sldId id="268" r:id="rId18"/>
+    <p:sldId id="278" r:id="rId19"/>
+    <p:sldId id="269" r:id="rId20"/>
+    <p:sldId id="271" r:id="rId21"/>
+    <p:sldId id="275" r:id="rId22"/>
   </p:sldIdLst>
   <p:sldSz cx="9144000" cy="6858000" type="screen4x3"/>
   <p:notesSz cx="6858000" cy="9144000"/>
   <p:custDataLst>
-    <p:tags r:id="rId21"/>
+    <p:tags r:id="rId23"/>
   </p:custDataLst>
   <p:defaultTextStyle>
     <a:defPPr>
@@ -3830,6 +3832,30 @@
           <a:chExt cx="0" cy="0"/>
         </a:xfrm>
       </p:grpSpPr>
+      <p:pic>
+        <p:nvPicPr>
+          <p:cNvPr id="4" name="Picture 3" descr="Life_restoration_of_a_group_of_giant_azhdarchids,_Quetzalcoatlus_northropi,_foraging_on_a_Cretaceous_fern_prairie.png"/>
+          <p:cNvPicPr>
+            <a:picLocks noChangeAspect="1"/>
+          </p:cNvPicPr>
+          <p:nvPr/>
+        </p:nvPicPr>
+        <p:blipFill>
+          <a:blip r:embed="rId2" cstate="print"/>
+          <a:stretch>
+            <a:fillRect/>
+          </a:stretch>
+        </p:blipFill>
+        <p:spPr>
+          <a:xfrm>
+            <a:off x="0" y="-92908"/>
+            <a:ext cx="9144000" cy="6950908"/>
+          </a:xfrm>
+          <a:prstGeom prst="rect">
+            <a:avLst/>
+          </a:prstGeom>
+        </p:spPr>
+      </p:pic>
       <p:sp>
         <p:nvSpPr>
           <p:cNvPr id="2" name="Title 1"/>
@@ -3842,21 +3868,39 @@
         </p:nvSpPr>
         <p:spPr>
           <a:xfrm>
-            <a:off x="1219200" y="3581400"/>
+            <a:off x="1905000" y="2133600"/>
             <a:ext cx="6858000" cy="990600"/>
           </a:xfrm>
         </p:spPr>
         <p:txBody>
           <a:bodyPr>
-            <a:normAutofit fontScale="90000"/>
+            <a:noAutofit/>
           </a:bodyPr>
           <a:lstStyle/>
           <a:p>
             <a:r>
-              <a:rPr lang="en-US" dirty="0" smtClean="0"/>
+              <a:rPr lang="en-US" dirty="0" smtClean="0">
+                <a:ln>
+                  <a:solidFill>
+                    <a:schemeClr val="tx1"/>
+                  </a:solidFill>
+                </a:ln>
+                <a:solidFill>
+                  <a:schemeClr val="bg1"/>
+                </a:solidFill>
+              </a:rPr>
               <a:t>XFLR5 Methods and Their Application in “Constraints on the Wing Morphology of Pterosaurs”</a:t>
             </a:r>
-            <a:endParaRPr lang="en-US" dirty="0"/>
+            <a:endParaRPr lang="en-US" dirty="0">
+              <a:ln>
+                <a:solidFill>
+                  <a:schemeClr val="tx1"/>
+                </a:solidFill>
+              </a:ln>
+              <a:solidFill>
+                <a:schemeClr val="bg1"/>
+              </a:solidFill>
+            </a:endParaRPr>
           </a:p>
         </p:txBody>
       </p:sp>
@@ -3870,7 +3914,12 @@
             <p:ph type="subTitle" idx="1"/>
           </p:nvPr>
         </p:nvSpPr>
-        <p:spPr/>
+        <p:spPr>
+          <a:xfrm>
+            <a:off x="1981200" y="6172200"/>
+            <a:ext cx="6858000" cy="533400"/>
+          </a:xfrm>
+        </p:spPr>
         <p:txBody>
           <a:bodyPr/>
           <a:lstStyle/>
@@ -3910,7 +3959,7 @@
       </p:grpSpPr>
       <p:sp>
         <p:nvSpPr>
-          <p:cNvPr id="4" name="Title 3"/>
+          <p:cNvPr id="2" name="Title 1"/>
           <p:cNvSpPr>
             <a:spLocks noGrp="1"/>
           </p:cNvSpPr>
@@ -3923,18 +3972,61 @@
           <a:bodyPr/>
           <a:lstStyle/>
           <a:p>
-            <a:endParaRPr lang="en-US"/>
+            <a:r>
+              <a:rPr lang="en-US" dirty="0" smtClean="0"/>
+              <a:t>VLM Vortex Lattice Method</a:t>
+            </a:r>
+            <a:endParaRPr lang="en-US" dirty="0"/>
+          </a:p>
+        </p:txBody>
+      </p:sp>
+      <p:sp>
+        <p:nvSpPr>
+          <p:cNvPr id="4" name="Content Placeholder 3"/>
+          <p:cNvSpPr>
+            <a:spLocks noGrp="1"/>
+          </p:cNvSpPr>
+          <p:nvPr>
+            <p:ph sz="quarter" idx="1"/>
+          </p:nvPr>
+        </p:nvSpPr>
+        <p:spPr/>
+        <p:txBody>
+          <a:bodyPr/>
+          <a:lstStyle/>
+          <a:p>
+            <a:r>
+              <a:rPr lang="en-US" dirty="0" smtClean="0"/>
+              <a:t>Assign circulation at control points</a:t>
+            </a:r>
+          </a:p>
+          <a:p>
+            <a:r>
+              <a:rPr lang="en-US" dirty="0" err="1" smtClean="0"/>
+              <a:t>Biot-Savart</a:t>
+            </a:r>
+            <a:r>
+              <a:rPr lang="en-US" dirty="0" smtClean="0"/>
+              <a:t> Law</a:t>
+            </a:r>
+          </a:p>
+          <a:p>
+            <a:r>
+              <a:rPr lang="en-US" dirty="0" smtClean="0"/>
+              <a:t>Flow tangency</a:t>
+            </a:r>
+            <a:endParaRPr lang="en-US" dirty="0"/>
           </a:p>
         </p:txBody>
       </p:sp>
       <p:pic>
         <p:nvPicPr>
-          <p:cNvPr id="7" name="Content Placeholder 6" descr="VLM1vortex.png"/>
+          <p:cNvPr id="6" name="Content Placeholder 5" descr="VLM1.PNG"/>
           <p:cNvPicPr>
             <a:picLocks noGrp="1" noChangeAspect="1"/>
           </p:cNvPicPr>
           <p:nvPr>
-            <p:ph sz="quarter" idx="1"/>
+            <p:ph sz="quarter" idx="2"/>
           </p:nvPr>
         </p:nvPicPr>
         <p:blipFill>
@@ -3945,31 +4037,8 @@
         </p:blipFill>
         <p:spPr>
           <a:xfrm>
-            <a:off x="304800" y="1676400"/>
-            <a:ext cx="4863502" cy="2286000"/>
-          </a:xfrm>
-        </p:spPr>
-      </p:pic>
-      <p:pic>
-        <p:nvPicPr>
-          <p:cNvPr id="8" name="Content Placeholder 7" descr="VLM2vortex.png"/>
-          <p:cNvPicPr>
-            <a:picLocks noGrp="1" noChangeAspect="1"/>
-          </p:cNvPicPr>
-          <p:nvPr>
-            <p:ph sz="quarter" idx="2"/>
-          </p:nvPr>
-        </p:nvPicPr>
-        <p:blipFill>
-          <a:blip r:embed="rId3" cstate="print"/>
-          <a:stretch>
-            <a:fillRect/>
-          </a:stretch>
-        </p:blipFill>
-        <p:spPr>
-          <a:xfrm>
-            <a:off x="4038600" y="4038600"/>
-            <a:ext cx="4863504" cy="2286000"/>
+            <a:off x="4572000" y="1524000"/>
+            <a:ext cx="4466420" cy="4576578"/>
           </a:xfrm>
         </p:spPr>
       </p:pic>
@@ -4015,15 +4084,15 @@
           <a:p>
             <a:r>
               <a:rPr lang="en-US" dirty="0" smtClean="0"/>
-              <a:t>3D Panel Method</a:t>
-            </a:r>
-            <a:endParaRPr lang="en-US" dirty="0"/>
-          </a:p>
-        </p:txBody>
-      </p:sp>
-      <p:sp>
-        <p:nvSpPr>
-          <p:cNvPr id="3" name="Content Placeholder 2"/>
+              <a:t>VLM2</a:t>
+            </a:r>
+            <a:endParaRPr lang="en-US" dirty="0"/>
+          </a:p>
+        </p:txBody>
+      </p:sp>
+      <p:sp>
+        <p:nvSpPr>
+          <p:cNvPr id="4" name="Content Placeholder 3"/>
           <p:cNvSpPr>
             <a:spLocks noGrp="1"/>
           </p:cNvSpPr>
@@ -4036,10 +4105,53 @@
           <a:bodyPr/>
           <a:lstStyle/>
           <a:p>
-            <a:endParaRPr lang="en-US"/>
-          </a:p>
-        </p:txBody>
-      </p:sp>
+            <a:r>
+              <a:rPr lang="en-US" dirty="0" smtClean="0"/>
+              <a:t>Uses quad or ring vortices on surface</a:t>
+            </a:r>
+          </a:p>
+          <a:p>
+            <a:r>
+              <a:rPr lang="en-US" dirty="0" smtClean="0"/>
+              <a:t>Uses horseshoe vortices on trailing edge to model wake</a:t>
+            </a:r>
+          </a:p>
+          <a:p>
+            <a:r>
+              <a:rPr lang="en-US" dirty="0" err="1" smtClean="0"/>
+              <a:t>Biot-Savart</a:t>
+            </a:r>
+            <a:r>
+              <a:rPr lang="en-US" dirty="0" smtClean="0"/>
+              <a:t> has V~1/r^3 so difference in trailing vortices is typically minor</a:t>
+            </a:r>
+            <a:endParaRPr lang="en-US" dirty="0"/>
+          </a:p>
+        </p:txBody>
+      </p:sp>
+      <p:pic>
+        <p:nvPicPr>
+          <p:cNvPr id="6" name="Content Placeholder 5" descr="VLM2.PNG"/>
+          <p:cNvPicPr>
+            <a:picLocks noGrp="1" noChangeAspect="1"/>
+          </p:cNvPicPr>
+          <p:nvPr>
+            <p:ph sz="quarter" idx="2"/>
+          </p:nvPr>
+        </p:nvPicPr>
+        <p:blipFill>
+          <a:blip r:embed="rId2" cstate="print"/>
+          <a:stretch>
+            <a:fillRect/>
+          </a:stretch>
+        </p:blipFill>
+        <p:spPr>
+          <a:xfrm>
+            <a:off x="4648200" y="1676400"/>
+            <a:ext cx="4347012" cy="3962400"/>
+          </a:xfrm>
+        </p:spPr>
+      </p:pic>
     </p:spTree>
   </p:cSld>
   <p:clrMapOvr>
@@ -4080,18 +4192,90 @@
           <a:bodyPr/>
           <a:lstStyle/>
           <a:p>
-            <a:endParaRPr lang="en-US"/>
+            <a:r>
+              <a:rPr lang="en-US" dirty="0" smtClean="0"/>
+              <a:t>3D Panel Method</a:t>
+            </a:r>
+            <a:endParaRPr lang="en-US" dirty="0"/>
+          </a:p>
+        </p:txBody>
+      </p:sp>
+      <p:sp>
+        <p:nvSpPr>
+          <p:cNvPr id="3" name="Content Placeholder 2"/>
+          <p:cNvSpPr>
+            <a:spLocks noGrp="1"/>
+          </p:cNvSpPr>
+          <p:nvPr>
+            <p:ph sz="quarter" idx="1"/>
+          </p:nvPr>
+        </p:nvSpPr>
+        <p:spPr>
+          <a:xfrm>
+            <a:off x="457200" y="3886200"/>
+            <a:ext cx="8382000" cy="2423160"/>
+          </a:xfrm>
+        </p:spPr>
+        <p:txBody>
+          <a:bodyPr/>
+          <a:lstStyle/>
+          <a:p>
+            <a:r>
+              <a:rPr lang="en-US" dirty="0" smtClean="0"/>
+              <a:t>Sources and Doublets distributed evenly across each panel</a:t>
+            </a:r>
+          </a:p>
+          <a:p>
+            <a:r>
+              <a:rPr lang="en-US" dirty="0" smtClean="0"/>
+              <a:t>Potential calculated at control points</a:t>
+            </a:r>
+          </a:p>
+          <a:p>
+            <a:pPr lvl="1"/>
+            <a:r>
+              <a:rPr lang="en-US" dirty="0" smtClean="0"/>
+              <a:t>Boundary layer analysis</a:t>
+            </a:r>
+          </a:p>
+          <a:p>
+            <a:pPr lvl="1"/>
+            <a:r>
+              <a:rPr lang="en-US" dirty="0" smtClean="0"/>
+              <a:t>Recalculation of potential at control points</a:t>
+            </a:r>
+          </a:p>
+          <a:p>
+            <a:r>
+              <a:rPr lang="en-US" dirty="0" smtClean="0"/>
+              <a:t>Full field calculated with potential field</a:t>
+            </a:r>
+          </a:p>
+          <a:p>
+            <a:endParaRPr lang="en-US" dirty="0" smtClean="0"/>
+          </a:p>
+          <a:p>
+            <a:endParaRPr lang="en-US" dirty="0" smtClean="0"/>
+          </a:p>
+          <a:p>
+            <a:endParaRPr lang="en-US" dirty="0" smtClean="0"/>
+          </a:p>
+          <a:p>
+            <a:endParaRPr lang="en-US" dirty="0" smtClean="0"/>
+          </a:p>
+          <a:p>
+            <a:endParaRPr lang="en-US" dirty="0"/>
           </a:p>
         </p:txBody>
       </p:sp>
       <p:pic>
         <p:nvPicPr>
-          <p:cNvPr id="4" name="Content Placeholder 3" descr="compare.PNG"/>
+          <p:cNvPr id="5" name="Content Placeholder 4" descr="panels.png"/>
           <p:cNvPicPr>
             <a:picLocks noGrp="1" noChangeAspect="1"/>
           </p:cNvPicPr>
           <p:nvPr>
-            <p:ph sz="quarter" idx="1"/>
+            <p:ph sz="quarter" idx="2"/>
           </p:nvPr>
         </p:nvPicPr>
         <p:blipFill>
@@ -4102,8 +4286,8 @@
         </p:blipFill>
         <p:spPr>
           <a:xfrm>
-            <a:off x="457200" y="1962101"/>
-            <a:ext cx="8229600" cy="3451323"/>
+            <a:off x="1676400" y="1219200"/>
+            <a:ext cx="5614738" cy="2667000"/>
           </a:xfrm>
         </p:spPr>
       </p:pic>
@@ -4147,33 +4331,155 @@
           <a:bodyPr/>
           <a:lstStyle/>
           <a:p>
-            <a:endParaRPr lang="en-US"/>
-          </a:p>
-        </p:txBody>
-      </p:sp>
-      <p:pic>
-        <p:nvPicPr>
-          <p:cNvPr id="6" name="Content Placeholder 5" descr="LLT.PNG"/>
-          <p:cNvPicPr>
-            <a:picLocks noGrp="1" noChangeAspect="1"/>
-          </p:cNvPicPr>
-          <p:nvPr>
-            <p:ph sz="quarter" idx="1"/>
-          </p:nvPr>
-        </p:nvPicPr>
-        <p:blipFill>
-          <a:blip r:embed="rId2" cstate="print"/>
-          <a:stretch>
-            <a:fillRect/>
-          </a:stretch>
-        </p:blipFill>
-        <p:spPr>
-          <a:xfrm>
-            <a:off x="304800" y="2128347"/>
-            <a:ext cx="8382000" cy="3533922"/>
-          </a:xfrm>
-        </p:spPr>
-      </p:pic>
+            <a:r>
+              <a:rPr lang="en-US" dirty="0" smtClean="0"/>
+              <a:t>3D Panel Method</a:t>
+            </a:r>
+            <a:endParaRPr lang="en-US" dirty="0"/>
+          </a:p>
+        </p:txBody>
+      </p:sp>
+      <p:sp>
+        <p:nvSpPr>
+          <p:cNvPr id="3" name="Text Placeholder 2"/>
+          <p:cNvSpPr>
+            <a:spLocks noGrp="1"/>
+          </p:cNvSpPr>
+          <p:nvPr>
+            <p:ph type="body" idx="1"/>
+          </p:nvPr>
+        </p:nvSpPr>
+        <p:spPr/>
+        <p:txBody>
+          <a:bodyPr/>
+          <a:lstStyle/>
+          <a:p>
+            <a:r>
+              <a:rPr lang="en-US" dirty="0" smtClean="0"/>
+              <a:t>Advantages</a:t>
+            </a:r>
+            <a:endParaRPr lang="en-US" dirty="0"/>
+          </a:p>
+        </p:txBody>
+      </p:sp>
+      <p:sp>
+        <p:nvSpPr>
+          <p:cNvPr id="4" name="Text Placeholder 3"/>
+          <p:cNvSpPr>
+            <a:spLocks noGrp="1"/>
+          </p:cNvSpPr>
+          <p:nvPr>
+            <p:ph type="body" sz="half" idx="3"/>
+          </p:nvPr>
+        </p:nvSpPr>
+        <p:spPr/>
+        <p:txBody>
+          <a:bodyPr/>
+          <a:lstStyle/>
+          <a:p>
+            <a:r>
+              <a:rPr lang="en-US" dirty="0" smtClean="0"/>
+              <a:t>Boundary Conditions</a:t>
+            </a:r>
+            <a:endParaRPr lang="en-US" dirty="0"/>
+          </a:p>
+        </p:txBody>
+      </p:sp>
+      <p:sp>
+        <p:nvSpPr>
+          <p:cNvPr id="5" name="Content Placeholder 4"/>
+          <p:cNvSpPr>
+            <a:spLocks noGrp="1"/>
+          </p:cNvSpPr>
+          <p:nvPr>
+            <p:ph sz="quarter" idx="2"/>
+          </p:nvPr>
+        </p:nvSpPr>
+        <p:spPr/>
+        <p:txBody>
+          <a:bodyPr/>
+          <a:lstStyle/>
+          <a:p>
+            <a:r>
+              <a:rPr lang="en-US" dirty="0" smtClean="0"/>
+              <a:t>Takes into account wing thickness</a:t>
+            </a:r>
+          </a:p>
+          <a:p>
+            <a:r>
+              <a:rPr lang="en-US" dirty="0" smtClean="0"/>
+              <a:t>Maps Cp over top and </a:t>
+            </a:r>
+            <a:r>
+              <a:rPr lang="en-US" dirty="0" smtClean="0"/>
+              <a:t>bottom</a:t>
+            </a:r>
+          </a:p>
+          <a:p>
+            <a:endParaRPr lang="en-US" dirty="0" smtClean="0"/>
+          </a:p>
+          <a:p>
+            <a:endParaRPr lang="en-US" dirty="0"/>
+          </a:p>
+        </p:txBody>
+      </p:sp>
+      <p:sp>
+        <p:nvSpPr>
+          <p:cNvPr id="6" name="Content Placeholder 5"/>
+          <p:cNvSpPr>
+            <a:spLocks noGrp="1"/>
+          </p:cNvSpPr>
+          <p:nvPr>
+            <p:ph sz="quarter" idx="4"/>
+          </p:nvPr>
+        </p:nvSpPr>
+        <p:spPr/>
+        <p:txBody>
+          <a:bodyPr/>
+          <a:lstStyle/>
+          <a:p>
+            <a:r>
+              <a:rPr lang="en-US" dirty="0" smtClean="0"/>
+              <a:t>Von </a:t>
+            </a:r>
+            <a:r>
+              <a:rPr lang="en-US" dirty="0" err="1" smtClean="0"/>
+              <a:t>Nuemann</a:t>
+            </a:r>
+            <a:endParaRPr lang="en-US" dirty="0" smtClean="0"/>
+          </a:p>
+          <a:p>
+            <a:pPr lvl="1"/>
+            <a:r>
+              <a:rPr lang="en-US" dirty="0" smtClean="0"/>
+              <a:t>Tangential flow condition</a:t>
+            </a:r>
+          </a:p>
+          <a:p>
+            <a:r>
+              <a:rPr lang="en-US" dirty="0" err="1" smtClean="0"/>
+              <a:t>Dirichlet</a:t>
+            </a:r>
+            <a:endParaRPr lang="en-US" dirty="0" smtClean="0"/>
+          </a:p>
+          <a:p>
+            <a:pPr lvl="1"/>
+            <a:r>
+              <a:rPr lang="en-US" dirty="0" smtClean="0"/>
+              <a:t>Potential inside body = </a:t>
+            </a:r>
+            <a:r>
+              <a:rPr lang="en-US" dirty="0" err="1" smtClean="0"/>
+              <a:t>Freestreem</a:t>
+            </a:r>
+            <a:r>
+              <a:rPr lang="en-US" dirty="0" smtClean="0"/>
+              <a:t> potential</a:t>
+            </a:r>
+            <a:endParaRPr lang="en-US" dirty="0"/>
+          </a:p>
+        </p:txBody>
+      </p:sp>
     </p:spTree>
   </p:cSld>
   <p:clrMapOvr>
@@ -4211,16 +4517,30 @@
         </p:nvSpPr>
         <p:spPr/>
         <p:txBody>
-          <a:bodyPr/>
-          <a:lstStyle/>
-          <a:p>
-            <a:endParaRPr lang="en-US"/>
+          <a:bodyPr>
+            <a:normAutofit fontScale="90000"/>
+          </a:bodyPr>
+          <a:lstStyle/>
+          <a:p>
+            <a:r>
+              <a:rPr lang="en-US" dirty="0" smtClean="0"/>
+              <a:t>Created Wings </a:t>
+            </a:r>
+            <a:r>
+              <a:rPr lang="en-US" dirty="0" smtClean="0"/>
+              <a:t>C</a:t>
+            </a:r>
+            <a:r>
+              <a:rPr lang="en-US" dirty="0" smtClean="0"/>
+              <a:t>ompared to Results in the Paper</a:t>
+            </a:r>
+            <a:endParaRPr lang="en-US" dirty="0"/>
           </a:p>
         </p:txBody>
       </p:sp>
       <p:pic>
         <p:nvPicPr>
-          <p:cNvPr id="4" name="Content Placeholder 3" descr="RVLM2.PNG"/>
+          <p:cNvPr id="4" name="Content Placeholder 3" descr="compare.PNG"/>
           <p:cNvPicPr>
             <a:picLocks noGrp="1" noChangeAspect="1"/>
           </p:cNvPicPr>
@@ -4236,8 +4556,8 @@
         </p:blipFill>
         <p:spPr>
           <a:xfrm>
-            <a:off x="381000" y="2114565"/>
-            <a:ext cx="8305800" cy="3529615"/>
+            <a:off x="457200" y="1962101"/>
+            <a:ext cx="8229600" cy="3451323"/>
           </a:xfrm>
         </p:spPr>
       </p:pic>
@@ -4281,13 +4601,17 @@
           <a:bodyPr/>
           <a:lstStyle/>
           <a:p>
-            <a:endParaRPr lang="en-US"/>
+            <a:r>
+              <a:rPr lang="en-US" dirty="0" smtClean="0"/>
+              <a:t>LLT Compared to VLM1 Results</a:t>
+            </a:r>
+            <a:endParaRPr lang="en-US" dirty="0"/>
           </a:p>
         </p:txBody>
       </p:sp>
       <p:pic>
         <p:nvPicPr>
-          <p:cNvPr id="4" name="Content Placeholder 3" descr="Panel.PNG"/>
+          <p:cNvPr id="6" name="Content Placeholder 5" descr="LLT.PNG"/>
           <p:cNvPicPr>
             <a:picLocks noGrp="1" noChangeAspect="1"/>
           </p:cNvPicPr>
@@ -4303,8 +4627,8 @@
         </p:blipFill>
         <p:spPr>
           <a:xfrm>
-            <a:off x="457200" y="1952928"/>
-            <a:ext cx="8229600" cy="3469669"/>
+            <a:off x="304800" y="2128347"/>
+            <a:ext cx="8382000" cy="3533922"/>
           </a:xfrm>
         </p:spPr>
       </p:pic>
@@ -4350,7 +4674,7 @@
           <a:p>
             <a:r>
               <a:rPr lang="en-US" dirty="0" smtClean="0"/>
-              <a:t>Airfoil Shape</a:t>
+              <a:t>VLM2 Compared to VLM1</a:t>
             </a:r>
             <a:endParaRPr lang="en-US" dirty="0"/>
           </a:p>
@@ -4358,7 +4682,7 @@
       </p:sp>
       <p:pic>
         <p:nvPicPr>
-          <p:cNvPr id="6" name="Content Placeholder 5" descr="green.png"/>
+          <p:cNvPr id="4" name="Content Placeholder 3" descr="RVLM2.PNG"/>
           <p:cNvPicPr>
             <a:picLocks noGrp="1" noChangeAspect="1"/>
           </p:cNvPicPr>
@@ -4374,8 +4698,8 @@
         </p:blipFill>
         <p:spPr>
           <a:xfrm>
-            <a:off x="457200" y="2258298"/>
-            <a:ext cx="8229600" cy="2858929"/>
+            <a:off x="381000" y="2114565"/>
+            <a:ext cx="8305800" cy="3529615"/>
           </a:xfrm>
         </p:spPr>
       </p:pic>
@@ -4421,7 +4745,7 @@
           <a:p>
             <a:r>
               <a:rPr lang="en-US" dirty="0" smtClean="0"/>
-              <a:t>Cp Distribution</a:t>
+              <a:t>3D Panel Compared to VLM1</a:t>
             </a:r>
             <a:endParaRPr lang="en-US" dirty="0"/>
           </a:p>
@@ -4429,7 +4753,7 @@
       </p:sp>
       <p:pic>
         <p:nvPicPr>
-          <p:cNvPr id="4" name="Content Placeholder 3" descr="bottompanel.png"/>
+          <p:cNvPr id="4" name="Content Placeholder 3" descr="Panel.PNG"/>
           <p:cNvPicPr>
             <a:picLocks noGrp="1" noChangeAspect="1"/>
           </p:cNvPicPr>
@@ -4445,143 +4769,11 @@
         </p:blipFill>
         <p:spPr>
           <a:xfrm>
-            <a:off x="533400" y="2057400"/>
-            <a:ext cx="3850105" cy="1828800"/>
+            <a:off x="457200" y="1952928"/>
+            <a:ext cx="8229600" cy="3469669"/>
           </a:xfrm>
         </p:spPr>
       </p:pic>
-      <p:pic>
-        <p:nvPicPr>
-          <p:cNvPr id="5" name="Picture 4" descr="toppanel.png"/>
-          <p:cNvPicPr>
-            <a:picLocks noChangeAspect="1"/>
-          </p:cNvPicPr>
-          <p:nvPr/>
-        </p:nvPicPr>
-        <p:blipFill>
-          <a:blip r:embed="rId3" cstate="print"/>
-          <a:stretch>
-            <a:fillRect/>
-          </a:stretch>
-        </p:blipFill>
-        <p:spPr>
-          <a:xfrm>
-            <a:off x="4800601" y="2057400"/>
-            <a:ext cx="3850105" cy="1828800"/>
-          </a:xfrm>
-          <a:prstGeom prst="rect">
-            <a:avLst/>
-          </a:prstGeom>
-        </p:spPr>
-      </p:pic>
-      <p:pic>
-        <p:nvPicPr>
-          <p:cNvPr id="6" name="Picture 5" descr="bottomvlm.png"/>
-          <p:cNvPicPr>
-            <a:picLocks noChangeAspect="1"/>
-          </p:cNvPicPr>
-          <p:nvPr/>
-        </p:nvPicPr>
-        <p:blipFill>
-          <a:blip r:embed="rId4" cstate="print"/>
-          <a:stretch>
-            <a:fillRect/>
-          </a:stretch>
-        </p:blipFill>
-        <p:spPr>
-          <a:xfrm>
-            <a:off x="533399" y="4419600"/>
-            <a:ext cx="3850105" cy="1828800"/>
-          </a:xfrm>
-          <a:prstGeom prst="rect">
-            <a:avLst/>
-          </a:prstGeom>
-        </p:spPr>
-      </p:pic>
-      <p:pic>
-        <p:nvPicPr>
-          <p:cNvPr id="7" name="Picture 6" descr="topvlm.png"/>
-          <p:cNvPicPr>
-            <a:picLocks noChangeAspect="1"/>
-          </p:cNvPicPr>
-          <p:nvPr/>
-        </p:nvPicPr>
-        <p:blipFill>
-          <a:blip r:embed="rId5" cstate="print"/>
-          <a:stretch>
-            <a:fillRect/>
-          </a:stretch>
-        </p:blipFill>
-        <p:spPr>
-          <a:xfrm>
-            <a:off x="4724400" y="4419600"/>
-            <a:ext cx="3850106" cy="1828800"/>
-          </a:xfrm>
-          <a:prstGeom prst="rect">
-            <a:avLst/>
-          </a:prstGeom>
-        </p:spPr>
-      </p:pic>
-      <p:sp>
-        <p:nvSpPr>
-          <p:cNvPr id="8" name="TextBox 7"/>
-          <p:cNvSpPr txBox="1"/>
-          <p:nvPr/>
-        </p:nvSpPr>
-        <p:spPr>
-          <a:xfrm>
-            <a:off x="4038600" y="1524000"/>
-            <a:ext cx="4343400" cy="369332"/>
-          </a:xfrm>
-          <a:prstGeom prst="rect">
-            <a:avLst/>
-          </a:prstGeom>
-          <a:noFill/>
-        </p:spPr>
-        <p:txBody>
-          <a:bodyPr wrap="square" rtlCol="0">
-            <a:spAutoFit/>
-          </a:bodyPr>
-          <a:lstStyle/>
-          <a:p>
-            <a:r>
-              <a:rPr lang="en-US" dirty="0" smtClean="0"/>
-              <a:t>3D Panel</a:t>
-            </a:r>
-            <a:endParaRPr lang="en-US" dirty="0"/>
-          </a:p>
-        </p:txBody>
-      </p:sp>
-      <p:sp>
-        <p:nvSpPr>
-          <p:cNvPr id="9" name="TextBox 8"/>
-          <p:cNvSpPr txBox="1"/>
-          <p:nvPr/>
-        </p:nvSpPr>
-        <p:spPr>
-          <a:xfrm>
-            <a:off x="4191000" y="3962400"/>
-            <a:ext cx="1447800" cy="369332"/>
-          </a:xfrm>
-          <a:prstGeom prst="rect">
-            <a:avLst/>
-          </a:prstGeom>
-          <a:noFill/>
-        </p:spPr>
-        <p:txBody>
-          <a:bodyPr wrap="square" rtlCol="0">
-            <a:spAutoFit/>
-          </a:bodyPr>
-          <a:lstStyle/>
-          <a:p>
-            <a:r>
-              <a:rPr lang="en-US" dirty="0" smtClean="0"/>
-              <a:t>VLM1</a:t>
-            </a:r>
-            <a:endParaRPr lang="en-US" dirty="0"/>
-          </a:p>
-        </p:txBody>
-      </p:sp>
     </p:spTree>
   </p:cSld>
   <p:clrMapOvr>
@@ -4624,31 +4816,35 @@
           <a:p>
             <a:r>
               <a:rPr lang="en-US" dirty="0" smtClean="0"/>
-              <a:t>Conclusions</a:t>
-            </a:r>
-            <a:endParaRPr lang="en-US" dirty="0"/>
-          </a:p>
-        </p:txBody>
-      </p:sp>
-      <p:sp>
-        <p:nvSpPr>
-          <p:cNvPr id="3" name="Content Placeholder 2"/>
-          <p:cNvSpPr>
-            <a:spLocks noGrp="1"/>
-          </p:cNvSpPr>
+              <a:t>Airfoil Shape</a:t>
+            </a:r>
+            <a:endParaRPr lang="en-US" dirty="0"/>
+          </a:p>
+        </p:txBody>
+      </p:sp>
+      <p:pic>
+        <p:nvPicPr>
+          <p:cNvPr id="6" name="Content Placeholder 5" descr="green.png"/>
+          <p:cNvPicPr>
+            <a:picLocks noGrp="1" noChangeAspect="1"/>
+          </p:cNvPicPr>
           <p:nvPr>
             <p:ph sz="quarter" idx="1"/>
           </p:nvPr>
-        </p:nvSpPr>
-        <p:spPr/>
-        <p:txBody>
-          <a:bodyPr/>
-          <a:lstStyle/>
-          <a:p>
-            <a:endParaRPr lang="en-US" dirty="0"/>
-          </a:p>
-        </p:txBody>
-      </p:sp>
+        </p:nvPicPr>
+        <p:blipFill>
+          <a:blip r:embed="rId2" cstate="print"/>
+          <a:stretch>
+            <a:fillRect/>
+          </a:stretch>
+        </p:blipFill>
+        <p:spPr>
+          <a:xfrm>
+            <a:off x="457200" y="2258298"/>
+            <a:ext cx="8229600" cy="2858929"/>
+          </a:xfrm>
+        </p:spPr>
+      </p:pic>
     </p:spTree>
   </p:cSld>
   <p:clrMapOvr>
@@ -4691,27 +4887,163 @@
           <a:p>
             <a:r>
               <a:rPr lang="en-US" dirty="0" smtClean="0"/>
-              <a:t>Question?</a:t>
-            </a:r>
-            <a:endParaRPr lang="en-US" dirty="0"/>
-          </a:p>
-        </p:txBody>
-      </p:sp>
-      <p:sp>
-        <p:nvSpPr>
-          <p:cNvPr id="3" name="Content Placeholder 2"/>
-          <p:cNvSpPr>
-            <a:spLocks noGrp="1"/>
-          </p:cNvSpPr>
+              <a:t>Cp Distribution</a:t>
+            </a:r>
+            <a:endParaRPr lang="en-US" dirty="0"/>
+          </a:p>
+        </p:txBody>
+      </p:sp>
+      <p:pic>
+        <p:nvPicPr>
+          <p:cNvPr id="4" name="Content Placeholder 3" descr="bottompanel.png"/>
+          <p:cNvPicPr>
+            <a:picLocks noGrp="1" noChangeAspect="1"/>
+          </p:cNvPicPr>
           <p:nvPr>
             <p:ph sz="quarter" idx="1"/>
           </p:nvPr>
-        </p:nvSpPr>
-        <p:spPr/>
-        <p:txBody>
-          <a:bodyPr/>
-          <a:lstStyle/>
-          <a:p>
+        </p:nvPicPr>
+        <p:blipFill>
+          <a:blip r:embed="rId2" cstate="print"/>
+          <a:stretch>
+            <a:fillRect/>
+          </a:stretch>
+        </p:blipFill>
+        <p:spPr>
+          <a:xfrm>
+            <a:off x="533400" y="2057400"/>
+            <a:ext cx="3850105" cy="1828800"/>
+          </a:xfrm>
+        </p:spPr>
+      </p:pic>
+      <p:pic>
+        <p:nvPicPr>
+          <p:cNvPr id="5" name="Picture 4" descr="toppanel.png"/>
+          <p:cNvPicPr>
+            <a:picLocks noChangeAspect="1"/>
+          </p:cNvPicPr>
+          <p:nvPr/>
+        </p:nvPicPr>
+        <p:blipFill>
+          <a:blip r:embed="rId3" cstate="print"/>
+          <a:stretch>
+            <a:fillRect/>
+          </a:stretch>
+        </p:blipFill>
+        <p:spPr>
+          <a:xfrm>
+            <a:off x="4800601" y="2057400"/>
+            <a:ext cx="3850105" cy="1828800"/>
+          </a:xfrm>
+          <a:prstGeom prst="rect">
+            <a:avLst/>
+          </a:prstGeom>
+        </p:spPr>
+      </p:pic>
+      <p:pic>
+        <p:nvPicPr>
+          <p:cNvPr id="6" name="Picture 5" descr="bottomvlm.png"/>
+          <p:cNvPicPr>
+            <a:picLocks noChangeAspect="1"/>
+          </p:cNvPicPr>
+          <p:nvPr/>
+        </p:nvPicPr>
+        <p:blipFill>
+          <a:blip r:embed="rId4" cstate="print"/>
+          <a:stretch>
+            <a:fillRect/>
+          </a:stretch>
+        </p:blipFill>
+        <p:spPr>
+          <a:xfrm>
+            <a:off x="533399" y="4419600"/>
+            <a:ext cx="3850105" cy="1828800"/>
+          </a:xfrm>
+          <a:prstGeom prst="rect">
+            <a:avLst/>
+          </a:prstGeom>
+        </p:spPr>
+      </p:pic>
+      <p:pic>
+        <p:nvPicPr>
+          <p:cNvPr id="7" name="Picture 6" descr="topvlm.png"/>
+          <p:cNvPicPr>
+            <a:picLocks noChangeAspect="1"/>
+          </p:cNvPicPr>
+          <p:nvPr/>
+        </p:nvPicPr>
+        <p:blipFill>
+          <a:blip r:embed="rId5" cstate="print"/>
+          <a:stretch>
+            <a:fillRect/>
+          </a:stretch>
+        </p:blipFill>
+        <p:spPr>
+          <a:xfrm>
+            <a:off x="4724400" y="4419600"/>
+            <a:ext cx="3850106" cy="1828800"/>
+          </a:xfrm>
+          <a:prstGeom prst="rect">
+            <a:avLst/>
+          </a:prstGeom>
+        </p:spPr>
+      </p:pic>
+      <p:sp>
+        <p:nvSpPr>
+          <p:cNvPr id="8" name="TextBox 7"/>
+          <p:cNvSpPr txBox="1"/>
+          <p:nvPr/>
+        </p:nvSpPr>
+        <p:spPr>
+          <a:xfrm>
+            <a:off x="4038600" y="1524000"/>
+            <a:ext cx="4343400" cy="369332"/>
+          </a:xfrm>
+          <a:prstGeom prst="rect">
+            <a:avLst/>
+          </a:prstGeom>
+          <a:noFill/>
+        </p:spPr>
+        <p:txBody>
+          <a:bodyPr wrap="square" rtlCol="0">
+            <a:spAutoFit/>
+          </a:bodyPr>
+          <a:lstStyle/>
+          <a:p>
+            <a:r>
+              <a:rPr lang="en-US" dirty="0" smtClean="0"/>
+              <a:t>3D Panel</a:t>
+            </a:r>
+            <a:endParaRPr lang="en-US" dirty="0"/>
+          </a:p>
+        </p:txBody>
+      </p:sp>
+      <p:sp>
+        <p:nvSpPr>
+          <p:cNvPr id="9" name="TextBox 8"/>
+          <p:cNvSpPr txBox="1"/>
+          <p:nvPr/>
+        </p:nvSpPr>
+        <p:spPr>
+          <a:xfrm>
+            <a:off x="4191000" y="3962400"/>
+            <a:ext cx="1447800" cy="369332"/>
+          </a:xfrm>
+          <a:prstGeom prst="rect">
+            <a:avLst/>
+          </a:prstGeom>
+          <a:noFill/>
+        </p:spPr>
+        <p:txBody>
+          <a:bodyPr wrap="square" rtlCol="0">
+            <a:spAutoFit/>
+          </a:bodyPr>
+          <a:lstStyle/>
+          <a:p>
+            <a:r>
+              <a:rPr lang="en-US" dirty="0" smtClean="0"/>
+              <a:t>VLM1</a:t>
+            </a:r>
             <a:endParaRPr lang="en-US" dirty="0"/>
           </a:p>
         </p:txBody>
@@ -4754,26 +5086,82 @@
         <p:spPr/>
         <p:txBody>
           <a:bodyPr>
-            <a:normAutofit/>
+            <a:normAutofit fontScale="90000"/>
           </a:bodyPr>
           <a:lstStyle/>
           <a:p>
             <a:r>
               <a:rPr lang="en-US" dirty="0" smtClean="0"/>
-              <a:t>Longitudinal Stability Analysis</a:t>
-            </a:r>
+              <a:t>Constraints on the wing morphology</a:t>
+            </a:r>
+            <a:br>
+              <a:rPr lang="en-US" dirty="0" smtClean="0"/>
+            </a:br>
+            <a:r>
+              <a:rPr lang="en-US" dirty="0" smtClean="0"/>
+              <a:t>of pterosaurs</a:t>
+            </a:r>
+            <a:endParaRPr lang="en-US" dirty="0"/>
+          </a:p>
+        </p:txBody>
+      </p:sp>
+      <p:sp>
+        <p:nvSpPr>
+          <p:cNvPr id="3" name="Content Placeholder 2"/>
+          <p:cNvSpPr>
+            <a:spLocks noGrp="1"/>
+          </p:cNvSpPr>
+          <p:nvPr>
+            <p:ph sz="quarter" idx="1"/>
+          </p:nvPr>
+        </p:nvSpPr>
+        <p:spPr/>
+        <p:txBody>
+          <a:bodyPr/>
+          <a:lstStyle/>
+          <a:p>
+            <a:r>
+              <a:rPr lang="en-US" dirty="0" smtClean="0"/>
+              <a:t>Wing shape is a mystery</a:t>
+            </a:r>
+          </a:p>
+          <a:p>
+            <a:pPr lvl="1"/>
+            <a:r>
+              <a:rPr lang="en-US" dirty="0" smtClean="0"/>
+              <a:t>Few soft tissue </a:t>
+            </a:r>
+            <a:r>
+              <a:rPr lang="en-US" dirty="0" smtClean="0"/>
+              <a:t>fossils</a:t>
+            </a:r>
+          </a:p>
+          <a:p>
+            <a:r>
+              <a:rPr lang="en-US" dirty="0" smtClean="0"/>
+              <a:t>No studies looking at the aerodynamic components</a:t>
+            </a:r>
+          </a:p>
+          <a:p>
+            <a:r>
+              <a:rPr lang="en-US" dirty="0" smtClean="0"/>
+              <a:t>Want to combine biomechanical and aerodynamic constraints to predict shape</a:t>
+            </a:r>
+          </a:p>
+          <a:p>
+            <a:pPr lvl="1"/>
             <a:endParaRPr lang="en-US" dirty="0"/>
           </a:p>
         </p:txBody>
       </p:sp>
       <p:pic>
         <p:nvPicPr>
-          <p:cNvPr id="4" name="Content Placeholder 3" descr="unstable.PNG"/>
+          <p:cNvPr id="5" name="Content Placeholder 4" descr="wingshapes.PNG"/>
           <p:cNvPicPr>
             <a:picLocks noGrp="1" noChangeAspect="1"/>
           </p:cNvPicPr>
           <p:nvPr>
-            <p:ph sz="quarter" idx="1"/>
+            <p:ph sz="quarter" idx="2"/>
           </p:nvPr>
         </p:nvPicPr>
         <p:blipFill>
@@ -4784,8 +5172,172 @@
         </p:blipFill>
         <p:spPr>
           <a:xfrm>
-            <a:off x="2548450" y="1219200"/>
-            <a:ext cx="4047099" cy="4937125"/>
+            <a:off x="4632325" y="1317175"/>
+            <a:ext cx="4041775" cy="4734825"/>
+          </a:xfrm>
+        </p:spPr>
+      </p:pic>
+    </p:spTree>
+  </p:cSld>
+  <p:clrMapOvr>
+    <a:masterClrMapping/>
+  </p:clrMapOvr>
+</p:sld>
+</file>
+
+<file path=ppt/slides/slide20.xml><?xml version="1.0" encoding="utf-8"?>
+<p:sld xmlns:a="http://schemas.openxmlformats.org/drawingml/2006/main" xmlns:r="http://schemas.openxmlformats.org/officeDocument/2006/relationships" xmlns:p="http://schemas.openxmlformats.org/presentationml/2006/main">
+  <p:cSld>
+    <p:spTree>
+      <p:nvGrpSpPr>
+        <p:cNvPr id="1" name=""/>
+        <p:cNvGrpSpPr/>
+        <p:nvPr/>
+      </p:nvGrpSpPr>
+      <p:grpSpPr>
+        <a:xfrm>
+          <a:off x="0" y="0"/>
+          <a:ext cx="0" cy="0"/>
+          <a:chOff x="0" y="0"/>
+          <a:chExt cx="0" cy="0"/>
+        </a:xfrm>
+      </p:grpSpPr>
+      <p:sp>
+        <p:nvSpPr>
+          <p:cNvPr id="2" name="Title 1"/>
+          <p:cNvSpPr>
+            <a:spLocks noGrp="1"/>
+          </p:cNvSpPr>
+          <p:nvPr>
+            <p:ph type="title"/>
+          </p:nvPr>
+        </p:nvSpPr>
+        <p:spPr/>
+        <p:txBody>
+          <a:bodyPr/>
+          <a:lstStyle/>
+          <a:p>
+            <a:r>
+              <a:rPr lang="en-US" dirty="0" smtClean="0"/>
+              <a:t>Conclusions</a:t>
+            </a:r>
+            <a:endParaRPr lang="en-US" dirty="0"/>
+          </a:p>
+        </p:txBody>
+      </p:sp>
+      <p:sp>
+        <p:nvSpPr>
+          <p:cNvPr id="3" name="Content Placeholder 2"/>
+          <p:cNvSpPr>
+            <a:spLocks noGrp="1"/>
+          </p:cNvSpPr>
+          <p:nvPr>
+            <p:ph sz="quarter" idx="1"/>
+          </p:nvPr>
+        </p:nvSpPr>
+        <p:spPr/>
+        <p:txBody>
+          <a:bodyPr/>
+          <a:lstStyle/>
+          <a:p>
+            <a:r>
+              <a:rPr lang="en-US" dirty="0" smtClean="0"/>
+              <a:t>VLM and 3D panel method yield different results</a:t>
+            </a:r>
+          </a:p>
+          <a:p>
+            <a:r>
+              <a:rPr lang="en-US" dirty="0" smtClean="0"/>
+              <a:t>Due to the variable thickness, 3D Panel method may yield more accurate results</a:t>
+            </a:r>
+          </a:p>
+          <a:p>
+            <a:r>
+              <a:rPr lang="en-US" dirty="0" smtClean="0"/>
+              <a:t>Potential flow models may be limited in flapping flight applications</a:t>
+            </a:r>
+          </a:p>
+          <a:p>
+            <a:r>
+              <a:rPr lang="en-US" dirty="0" smtClean="0"/>
+              <a:t>Trends shown are repeatable</a:t>
+            </a:r>
+          </a:p>
+        </p:txBody>
+      </p:sp>
+    </p:spTree>
+  </p:cSld>
+  <p:clrMapOvr>
+    <a:masterClrMapping/>
+  </p:clrMapOvr>
+</p:sld>
+</file>
+
+<file path=ppt/slides/slide21.xml><?xml version="1.0" encoding="utf-8"?>
+<p:sld xmlns:a="http://schemas.openxmlformats.org/drawingml/2006/main" xmlns:r="http://schemas.openxmlformats.org/officeDocument/2006/relationships" xmlns:p="http://schemas.openxmlformats.org/presentationml/2006/main">
+  <p:cSld>
+    <p:spTree>
+      <p:nvGrpSpPr>
+        <p:cNvPr id="1" name=""/>
+        <p:cNvGrpSpPr/>
+        <p:nvPr/>
+      </p:nvGrpSpPr>
+      <p:grpSpPr>
+        <a:xfrm>
+          <a:off x="0" y="0"/>
+          <a:ext cx="0" cy="0"/>
+          <a:chOff x="0" y="0"/>
+          <a:chExt cx="0" cy="0"/>
+        </a:xfrm>
+      </p:grpSpPr>
+      <p:sp>
+        <p:nvSpPr>
+          <p:cNvPr id="2" name="Title 1"/>
+          <p:cNvSpPr>
+            <a:spLocks noGrp="1"/>
+          </p:cNvSpPr>
+          <p:nvPr>
+            <p:ph type="title" idx="4294967295"/>
+          </p:nvPr>
+        </p:nvSpPr>
+        <p:spPr>
+          <a:xfrm>
+            <a:off x="0" y="152400"/>
+            <a:ext cx="8229600" cy="990600"/>
+          </a:xfrm>
+        </p:spPr>
+        <p:txBody>
+          <a:bodyPr/>
+          <a:lstStyle/>
+          <a:p>
+            <a:r>
+              <a:rPr lang="en-US" dirty="0" smtClean="0"/>
+              <a:t>Question?</a:t>
+            </a:r>
+            <a:endParaRPr lang="en-US" dirty="0"/>
+          </a:p>
+        </p:txBody>
+      </p:sp>
+      <p:pic>
+        <p:nvPicPr>
+          <p:cNvPr id="4" name="Content Placeholder 3" descr="090107-pterosaur-picture_big.jpg"/>
+          <p:cNvPicPr>
+            <a:picLocks noGrp="1" noChangeAspect="1"/>
+          </p:cNvPicPr>
+          <p:nvPr>
+            <p:ph sz="quarter" idx="4294967295"/>
+          </p:nvPr>
+        </p:nvPicPr>
+        <p:blipFill>
+          <a:blip r:embed="rId2" cstate="print"/>
+          <a:stretch>
+            <a:fillRect/>
+          </a:stretch>
+        </p:blipFill>
+        <p:spPr>
+          <a:xfrm>
+            <a:off x="2438400" y="228600"/>
+            <a:ext cx="6096000" cy="5950238"/>
           </a:xfrm>
         </p:spPr>
       </p:pic>
@@ -4826,12 +5378,14 @@
         </p:nvSpPr>
         <p:spPr/>
         <p:txBody>
-          <a:bodyPr/>
-          <a:lstStyle/>
-          <a:p>
-            <a:r>
-              <a:rPr lang="en-US" dirty="0" smtClean="0"/>
-              <a:t>Effects of Washout</a:t>
+          <a:bodyPr>
+            <a:normAutofit/>
+          </a:bodyPr>
+          <a:lstStyle/>
+          <a:p>
+            <a:r>
+              <a:rPr lang="en-US" dirty="0" smtClean="0"/>
+              <a:t>Longitudinal Stability Analysis</a:t>
             </a:r>
             <a:endParaRPr lang="en-US" dirty="0"/>
           </a:p>
@@ -4839,7 +5393,7 @@
       </p:sp>
       <p:pic>
         <p:nvPicPr>
-          <p:cNvPr id="4" name="Content Placeholder 3" descr="figure8.PNG"/>
+          <p:cNvPr id="4" name="Content Placeholder 3" descr="unstable.PNG"/>
           <p:cNvPicPr>
             <a:picLocks noGrp="1" noChangeAspect="1"/>
           </p:cNvPicPr>
@@ -4855,8 +5409,8 @@
         </p:blipFill>
         <p:spPr>
           <a:xfrm>
-            <a:off x="2121957" y="1896907"/>
-            <a:ext cx="4900085" cy="3581711"/>
+            <a:off x="2590800" y="1295400"/>
+            <a:ext cx="4041775" cy="4930630"/>
           </a:xfrm>
         </p:spPr>
       </p:pic>
@@ -4902,7 +5456,7 @@
           <a:p>
             <a:r>
               <a:rPr lang="en-US" dirty="0" smtClean="0"/>
-              <a:t>XFLR5</a:t>
+              <a:t>Effects of Washout</a:t>
             </a:r>
             <a:endParaRPr lang="en-US" dirty="0"/>
           </a:p>
@@ -4910,7 +5464,7 @@
       </p:sp>
       <p:pic>
         <p:nvPicPr>
-          <p:cNvPr id="4" name="Content Placeholder 3" descr="XFLR5wing.PNG"/>
+          <p:cNvPr id="4" name="Content Placeholder 3" descr="figure8.PNG"/>
           <p:cNvPicPr>
             <a:picLocks noGrp="1" noChangeAspect="1"/>
           </p:cNvPicPr>
@@ -4926,8 +5480,8 @@
         </p:blipFill>
         <p:spPr>
           <a:xfrm>
-            <a:off x="782103" y="1219200"/>
-            <a:ext cx="7579793" cy="4937125"/>
+            <a:off x="1295400" y="1219200"/>
+            <a:ext cx="6564842" cy="4798563"/>
           </a:xfrm>
         </p:spPr>
       </p:pic>
@@ -4973,7 +5527,7 @@
           <a:p>
             <a:r>
               <a:rPr lang="en-US" dirty="0" smtClean="0"/>
-              <a:t>LLT Lifting Line Theory</a:t>
+              <a:t>XFLR5</a:t>
             </a:r>
             <a:endParaRPr lang="en-US" dirty="0"/>
           </a:p>
@@ -4981,7 +5535,7 @@
       </p:sp>
       <p:pic>
         <p:nvPicPr>
-          <p:cNvPr id="4" name="Content Placeholder 3" descr="800px-Lifting_line_theory_illustration_(2).svg.png"/>
+          <p:cNvPr id="4" name="Content Placeholder 3" descr="XFLR5wing.PNG"/>
           <p:cNvPicPr>
             <a:picLocks noGrp="1" noChangeAspect="1"/>
           </p:cNvPicPr>
@@ -4997,116 +5551,11 @@
         </p:blipFill>
         <p:spPr>
           <a:xfrm>
-            <a:off x="2971800" y="1676400"/>
-            <a:ext cx="5495559" cy="4114800"/>
+            <a:off x="782103" y="1219200"/>
+            <a:ext cx="7579793" cy="4937125"/>
           </a:xfrm>
         </p:spPr>
       </p:pic>
-      <p:sp>
-        <p:nvSpPr>
-          <p:cNvPr id="5" name="Content Placeholder 4"/>
-          <p:cNvSpPr>
-            <a:spLocks noGrp="1"/>
-          </p:cNvSpPr>
-          <p:nvPr>
-            <p:ph sz="quarter" idx="2"/>
-          </p:nvPr>
-        </p:nvSpPr>
-        <p:spPr>
-          <a:xfrm>
-            <a:off x="304800" y="1676400"/>
-            <a:ext cx="4038600" cy="4525963"/>
-          </a:xfrm>
-        </p:spPr>
-        <p:txBody>
-          <a:bodyPr>
-            <a:normAutofit fontScale="77500" lnSpcReduction="20000"/>
-          </a:bodyPr>
-          <a:lstStyle/>
-          <a:p>
-            <a:r>
-              <a:rPr lang="en-US" i="1" dirty="0" err="1" smtClean="0"/>
-              <a:t>Kutta_Joukowski</a:t>
-            </a:r>
-            <a:endParaRPr lang="en-US" i="1" dirty="0" smtClean="0"/>
-          </a:p>
-          <a:p>
-            <a:r>
-              <a:rPr lang="en-US" i="1" dirty="0" err="1" smtClean="0"/>
-              <a:t>Biot-Savart</a:t>
-            </a:r>
-            <a:endParaRPr lang="en-US" i="1" dirty="0" smtClean="0"/>
-          </a:p>
-          <a:p>
-            <a:r>
-              <a:rPr lang="en-US" i="1" dirty="0" smtClean="0"/>
-              <a:t>Helmholtz Theorem</a:t>
-            </a:r>
-          </a:p>
-          <a:p>
-            <a:pPr lvl="1"/>
-            <a:r>
-              <a:rPr lang="en-US" dirty="0" smtClean="0"/>
-              <a:t>The strength of a vortex filament is constant </a:t>
-            </a:r>
-            <a:r>
-              <a:rPr lang="en-US" dirty="0" smtClean="0"/>
-              <a:t>along </a:t>
-            </a:r>
-            <a:r>
-              <a:rPr lang="en-US" dirty="0" smtClean="0"/>
-              <a:t>its length</a:t>
-            </a:r>
-          </a:p>
-          <a:p>
-            <a:pPr lvl="1"/>
-            <a:r>
-              <a:rPr lang="en-US" dirty="0" smtClean="0"/>
-              <a:t>A vortex filament cannot end in a fluid: must extend to infinity or form a closed </a:t>
-            </a:r>
-            <a:r>
-              <a:rPr lang="en-US" dirty="0" smtClean="0"/>
-              <a:t>path</a:t>
-            </a:r>
-            <a:endParaRPr lang="en-US" i="1" dirty="0" smtClean="0"/>
-          </a:p>
-          <a:p>
-            <a:r>
-              <a:rPr lang="en-US" i="1" dirty="0" smtClean="0"/>
-              <a:t>Effective angle of attack</a:t>
-            </a:r>
-          </a:p>
-          <a:p>
-            <a:r>
-              <a:rPr lang="en-US" i="1" dirty="0" smtClean="0"/>
-              <a:t>Repeat</a:t>
-            </a:r>
-          </a:p>
-          <a:p>
-            <a:pPr lvl="1"/>
-            <a:endParaRPr lang="en-US" i="1" dirty="0" smtClean="0"/>
-          </a:p>
-          <a:p>
-            <a:pPr>
-              <a:buNone/>
-            </a:pPr>
-            <a:endParaRPr lang="en-US" i="1" dirty="0" smtClean="0"/>
-          </a:p>
-          <a:p>
-            <a:pPr lvl="1">
-              <a:buNone/>
-            </a:pPr>
-            <a:r>
-              <a:rPr lang="el-GR" dirty="0" smtClean="0"/>
-              <a:t/>
-            </a:r>
-            <a:br>
-              <a:rPr lang="el-GR" dirty="0" smtClean="0"/>
-            </a:br>
-            <a:endParaRPr lang="en-US" dirty="0"/>
-          </a:p>
-        </p:txBody>
-      </p:sp>
     </p:spTree>
   </p:cSld>
   <p:clrMapOvr>
@@ -5149,20 +5598,20 @@
           <a:p>
             <a:r>
               <a:rPr lang="en-US" dirty="0" smtClean="0"/>
-              <a:t>LLT</a:t>
-            </a:r>
-            <a:endParaRPr lang="en-US" dirty="0"/>
-          </a:p>
-        </p:txBody>
-      </p:sp>
-      <p:sp>
-        <p:nvSpPr>
-          <p:cNvPr id="6" name="Text Placeholder 5"/>
-          <p:cNvSpPr>
-            <a:spLocks noGrp="1"/>
-          </p:cNvSpPr>
-          <p:nvPr>
-            <p:ph type="body" idx="1"/>
+              <a:t>Python Coding</a:t>
+            </a:r>
+            <a:endParaRPr lang="en-US" dirty="0"/>
+          </a:p>
+        </p:txBody>
+      </p:sp>
+      <p:sp>
+        <p:nvSpPr>
+          <p:cNvPr id="3" name="Content Placeholder 2"/>
+          <p:cNvSpPr>
+            <a:spLocks noGrp="1"/>
+          </p:cNvSpPr>
+          <p:nvPr>
+            <p:ph sz="quarter" idx="1"/>
           </p:nvPr>
         </p:nvSpPr>
         <p:spPr/>
@@ -5172,49 +5621,13 @@
           <a:p>
             <a:r>
               <a:rPr lang="en-US" dirty="0" smtClean="0"/>
-              <a:t>Limitations</a:t>
-            </a:r>
-            <a:endParaRPr lang="en-US" dirty="0"/>
-          </a:p>
-        </p:txBody>
-      </p:sp>
-      <p:sp>
-        <p:nvSpPr>
-          <p:cNvPr id="7" name="Content Placeholder 6"/>
-          <p:cNvSpPr>
-            <a:spLocks noGrp="1"/>
-          </p:cNvSpPr>
-          <p:nvPr>
-            <p:ph sz="quarter" idx="2"/>
-          </p:nvPr>
-        </p:nvSpPr>
-        <p:spPr/>
-        <p:txBody>
-          <a:bodyPr/>
-          <a:lstStyle/>
-          <a:p>
-            <a:r>
-              <a:rPr lang="en-US" dirty="0" smtClean="0"/>
-              <a:t>Does not account for sweep</a:t>
-            </a:r>
-          </a:p>
-          <a:p>
-            <a:r>
-              <a:rPr lang="en-US" dirty="0" smtClean="0"/>
-              <a:t>Does not account for dihedral </a:t>
-            </a:r>
-          </a:p>
-          <a:p>
-            <a:r>
-              <a:rPr lang="en-US" dirty="0" err="1" smtClean="0"/>
-              <a:t>Inviscid</a:t>
-            </a:r>
-            <a:endParaRPr lang="en-US" dirty="0" smtClean="0"/>
-          </a:p>
-          <a:p>
-            <a:r>
-              <a:rPr lang="en-US" dirty="0" smtClean="0"/>
-              <a:t>Must have high Aspect Ratio</a:t>
+              <a:t>Create dictionary that includes each wings class</a:t>
+            </a:r>
+          </a:p>
+          <a:p>
+            <a:r>
+              <a:rPr lang="en-US" dirty="0" smtClean="0"/>
+              <a:t>Allows the calling of a specific wing class without storing different variables</a:t>
             </a:r>
             <a:endParaRPr lang="en-US" dirty="0"/>
           </a:p>
@@ -5222,12 +5635,12 @@
       </p:sp>
       <p:pic>
         <p:nvPicPr>
-          <p:cNvPr id="10" name="Content Placeholder 9" descr="800px-Lifting_line_theory_illustration_(2).svg.png"/>
+          <p:cNvPr id="5" name="Content Placeholder 4" descr="dict.PNG"/>
           <p:cNvPicPr>
             <a:picLocks noGrp="1" noChangeAspect="1"/>
           </p:cNvPicPr>
           <p:nvPr>
-            <p:ph sz="quarter" idx="4"/>
+            <p:ph sz="quarter" idx="2"/>
           </p:nvPr>
         </p:nvPicPr>
         <p:blipFill>
@@ -5238,8 +5651,8 @@
         </p:blipFill>
         <p:spPr>
           <a:xfrm>
-            <a:off x="3048000" y="990600"/>
-            <a:ext cx="5699098" cy="4267200"/>
+            <a:off x="4495800" y="1600200"/>
+            <a:ext cx="4267200" cy="1153574"/>
           </a:xfrm>
         </p:spPr>
       </p:pic>
@@ -5285,98 +5698,20 @@
           <a:p>
             <a:r>
               <a:rPr lang="en-US" dirty="0" smtClean="0"/>
-              <a:t>Lifting Surface Theory</a:t>
-            </a:r>
-            <a:endParaRPr lang="en-US" dirty="0"/>
-          </a:p>
-        </p:txBody>
-      </p:sp>
-      <p:sp>
-        <p:nvSpPr>
-          <p:cNvPr id="4" name="Content Placeholder 3"/>
-          <p:cNvSpPr>
-            <a:spLocks noGrp="1"/>
-          </p:cNvSpPr>
-          <p:nvPr>
-            <p:ph sz="quarter" idx="1"/>
-          </p:nvPr>
-        </p:nvSpPr>
-        <p:spPr/>
-        <p:txBody>
-          <a:bodyPr/>
-          <a:lstStyle/>
-          <a:p>
-            <a:r>
-              <a:rPr lang="en-US" dirty="0" smtClean="0"/>
-              <a:t>Series of lifting lines</a:t>
-            </a:r>
-          </a:p>
-          <a:p>
-            <a:r>
-              <a:rPr lang="en-US" dirty="0" smtClean="0"/>
-              <a:t>Circulation varies in both</a:t>
-            </a:r>
-          </a:p>
-          <a:p>
-            <a:pPr lvl="1"/>
-            <a:r>
-              <a:rPr lang="en-US" dirty="0" smtClean="0">
-                <a:solidFill>
-                  <a:schemeClr val="tx1"/>
-                </a:solidFill>
-              </a:rPr>
-              <a:t>Span wise lifting line</a:t>
-            </a:r>
-          </a:p>
-          <a:p>
-            <a:pPr lvl="1"/>
-            <a:r>
-              <a:rPr lang="en-US" dirty="0" smtClean="0">
-                <a:solidFill>
-                  <a:schemeClr val="tx1"/>
-                </a:solidFill>
-              </a:rPr>
-              <a:t>Chord wise </a:t>
-            </a:r>
-            <a:r>
-              <a:rPr lang="en-US" dirty="0" smtClean="0">
-                <a:solidFill>
-                  <a:schemeClr val="tx1"/>
-                </a:solidFill>
-              </a:rPr>
-              <a:t>vortices</a:t>
-            </a:r>
-            <a:endParaRPr lang="en-US" dirty="0" smtClean="0"/>
-          </a:p>
-          <a:p>
-            <a:r>
-              <a:rPr lang="en-US" dirty="0" smtClean="0"/>
-              <a:t>Chord wise vortices extend into wake.</a:t>
-            </a:r>
-          </a:p>
-          <a:p>
-            <a:r>
-              <a:rPr lang="en-US" dirty="0" err="1" smtClean="0"/>
-              <a:t>Biot-Savart</a:t>
-            </a:r>
-            <a:endParaRPr lang="en-US" dirty="0" smtClean="0"/>
-          </a:p>
-          <a:p>
-            <a:r>
-              <a:rPr lang="en-US" dirty="0" smtClean="0"/>
-              <a:t>Flow tangency condition</a:t>
-            </a:r>
+              <a:t>LLT Lifting Line Theory</a:t>
+            </a:r>
+            <a:endParaRPr lang="en-US" dirty="0"/>
           </a:p>
         </p:txBody>
       </p:sp>
       <p:pic>
         <p:nvPicPr>
-          <p:cNvPr id="8" name="Content Placeholder 7" descr="lsurface.PNG"/>
+          <p:cNvPr id="4" name="Content Placeholder 3" descr="800px-Lifting_line_theory_illustration_(2).svg.png"/>
           <p:cNvPicPr>
             <a:picLocks noGrp="1" noChangeAspect="1"/>
           </p:cNvPicPr>
           <p:nvPr>
-            <p:ph sz="quarter" idx="2"/>
+            <p:ph sz="quarter" idx="1"/>
           </p:nvPr>
         </p:nvPicPr>
         <p:blipFill>
@@ -5387,11 +5722,116 @@
         </p:blipFill>
         <p:spPr>
           <a:xfrm>
-            <a:off x="4267200" y="1371600"/>
-            <a:ext cx="4657603" cy="4343400"/>
+            <a:off x="2971800" y="1676400"/>
+            <a:ext cx="5495559" cy="4114800"/>
           </a:xfrm>
         </p:spPr>
       </p:pic>
+      <p:sp>
+        <p:nvSpPr>
+          <p:cNvPr id="5" name="Content Placeholder 4"/>
+          <p:cNvSpPr>
+            <a:spLocks noGrp="1"/>
+          </p:cNvSpPr>
+          <p:nvPr>
+            <p:ph sz="quarter" idx="2"/>
+          </p:nvPr>
+        </p:nvSpPr>
+        <p:spPr>
+          <a:xfrm>
+            <a:off x="304800" y="1676400"/>
+            <a:ext cx="4038600" cy="4525963"/>
+          </a:xfrm>
+        </p:spPr>
+        <p:txBody>
+          <a:bodyPr>
+            <a:normAutofit fontScale="77500" lnSpcReduction="20000"/>
+          </a:bodyPr>
+          <a:lstStyle/>
+          <a:p>
+            <a:r>
+              <a:rPr lang="en-US" i="1" dirty="0" err="1" smtClean="0"/>
+              <a:t>Kutta_Joukowski</a:t>
+            </a:r>
+            <a:endParaRPr lang="en-US" i="1" dirty="0" smtClean="0"/>
+          </a:p>
+          <a:p>
+            <a:r>
+              <a:rPr lang="en-US" i="1" dirty="0" err="1" smtClean="0"/>
+              <a:t>Biot-Savart</a:t>
+            </a:r>
+            <a:endParaRPr lang="en-US" i="1" dirty="0" smtClean="0"/>
+          </a:p>
+          <a:p>
+            <a:r>
+              <a:rPr lang="en-US" i="1" dirty="0" smtClean="0"/>
+              <a:t>Helmholtz Theorem</a:t>
+            </a:r>
+          </a:p>
+          <a:p>
+            <a:pPr lvl="1"/>
+            <a:r>
+              <a:rPr lang="en-US" dirty="0" smtClean="0"/>
+              <a:t>The strength of a vortex filament is constant </a:t>
+            </a:r>
+            <a:r>
+              <a:rPr lang="en-US" dirty="0" smtClean="0"/>
+              <a:t>along </a:t>
+            </a:r>
+            <a:r>
+              <a:rPr lang="en-US" dirty="0" smtClean="0"/>
+              <a:t>its length</a:t>
+            </a:r>
+          </a:p>
+          <a:p>
+            <a:pPr lvl="1"/>
+            <a:r>
+              <a:rPr lang="en-US" dirty="0" smtClean="0"/>
+              <a:t>A vortex filament cannot end in a fluid: must extend to infinity or form a closed </a:t>
+            </a:r>
+            <a:r>
+              <a:rPr lang="en-US" dirty="0" smtClean="0"/>
+              <a:t>path</a:t>
+            </a:r>
+            <a:endParaRPr lang="en-US" i="1" dirty="0" smtClean="0"/>
+          </a:p>
+          <a:p>
+            <a:r>
+              <a:rPr lang="en-US" i="1" dirty="0" smtClean="0"/>
+              <a:t>Effective angle of attack</a:t>
+            </a:r>
+          </a:p>
+          <a:p>
+            <a:r>
+              <a:rPr lang="en-US" i="1" dirty="0" smtClean="0"/>
+              <a:t>Repeat</a:t>
+            </a:r>
+          </a:p>
+          <a:p>
+            <a:pPr lvl="1"/>
+            <a:endParaRPr lang="en-US" i="1" dirty="0" smtClean="0"/>
+          </a:p>
+          <a:p>
+            <a:pPr>
+              <a:buNone/>
+            </a:pPr>
+            <a:endParaRPr lang="en-US" i="1" dirty="0" smtClean="0"/>
+          </a:p>
+          <a:p>
+            <a:pPr lvl="1">
+              <a:buNone/>
+            </a:pPr>
+            <a:r>
+              <a:rPr lang="el-GR" dirty="0" smtClean="0"/>
+              <a:t/>
+            </a:r>
+            <a:br>
+              <a:rPr lang="el-GR" dirty="0" smtClean="0"/>
+            </a:br>
+            <a:endParaRPr lang="en-US" dirty="0"/>
+          </a:p>
+        </p:txBody>
+      </p:sp>
     </p:spTree>
   </p:cSld>
   <p:clrMapOvr>
@@ -5434,20 +5874,20 @@
           <a:p>
             <a:r>
               <a:rPr lang="en-US" dirty="0" smtClean="0"/>
-              <a:t>VLM Vortex Lattice Method</a:t>
-            </a:r>
-            <a:endParaRPr lang="en-US" dirty="0"/>
-          </a:p>
-        </p:txBody>
-      </p:sp>
-      <p:sp>
-        <p:nvSpPr>
-          <p:cNvPr id="4" name="Content Placeholder 3"/>
-          <p:cNvSpPr>
-            <a:spLocks noGrp="1"/>
-          </p:cNvSpPr>
-          <p:nvPr>
-            <p:ph sz="quarter" idx="1"/>
+              <a:t>LLT</a:t>
+            </a:r>
+            <a:endParaRPr lang="en-US" dirty="0"/>
+          </a:p>
+        </p:txBody>
+      </p:sp>
+      <p:sp>
+        <p:nvSpPr>
+          <p:cNvPr id="6" name="Text Placeholder 5"/>
+          <p:cNvSpPr>
+            <a:spLocks noGrp="1"/>
+          </p:cNvSpPr>
+          <p:nvPr>
+            <p:ph type="body" idx="1"/>
           </p:nvPr>
         </p:nvSpPr>
         <p:spPr/>
@@ -5457,23 +5897,49 @@
           <a:p>
             <a:r>
               <a:rPr lang="en-US" dirty="0" smtClean="0"/>
-              <a:t>Assign circulation at control points</a:t>
+              <a:t>Limitations</a:t>
+            </a:r>
+            <a:endParaRPr lang="en-US" dirty="0"/>
+          </a:p>
+        </p:txBody>
+      </p:sp>
+      <p:sp>
+        <p:nvSpPr>
+          <p:cNvPr id="7" name="Content Placeholder 6"/>
+          <p:cNvSpPr>
+            <a:spLocks noGrp="1"/>
+          </p:cNvSpPr>
+          <p:nvPr>
+            <p:ph sz="quarter" idx="2"/>
+          </p:nvPr>
+        </p:nvSpPr>
+        <p:spPr/>
+        <p:txBody>
+          <a:bodyPr/>
+          <a:lstStyle/>
+          <a:p>
+            <a:r>
+              <a:rPr lang="en-US" dirty="0" smtClean="0"/>
+              <a:t>Does not account for sweep</a:t>
+            </a:r>
+          </a:p>
+          <a:p>
+            <a:r>
+              <a:rPr lang="en-US" dirty="0" smtClean="0"/>
+              <a:t>Does not account for dihedral </a:t>
             </a:r>
           </a:p>
           <a:p>
             <a:r>
               <a:rPr lang="en-US" dirty="0" err="1" smtClean="0"/>
-              <a:t>Biot-Savart</a:t>
-            </a:r>
-            <a:r>
-              <a:rPr lang="en-US" dirty="0" smtClean="0"/>
-              <a:t> Law</a:t>
-            </a:r>
-          </a:p>
-          <a:p>
-            <a:r>
-              <a:rPr lang="en-US" dirty="0" smtClean="0"/>
-              <a:t>Flow tangency</a:t>
+              <a:t>Inviscid</a:t>
+            </a:r>
+            <a:endParaRPr lang="en-US" dirty="0" smtClean="0"/>
+          </a:p>
+          <a:p>
+            <a:r>
+              <a:rPr lang="en-US" dirty="0" smtClean="0"/>
+              <a:t>Must have high Aspect Ratio</a:t>
             </a:r>
             <a:endParaRPr lang="en-US" dirty="0"/>
           </a:p>
@@ -5481,12 +5947,12 @@
       </p:sp>
       <p:pic>
         <p:nvPicPr>
-          <p:cNvPr id="6" name="Content Placeholder 5" descr="VLM1.PNG"/>
+          <p:cNvPr id="10" name="Content Placeholder 9" descr="800px-Lifting_line_theory_illustration_(2).svg.png"/>
           <p:cNvPicPr>
             <a:picLocks noGrp="1" noChangeAspect="1"/>
           </p:cNvPicPr>
           <p:nvPr>
-            <p:ph sz="quarter" idx="2"/>
+            <p:ph sz="quarter" idx="4"/>
           </p:nvPr>
         </p:nvPicPr>
         <p:blipFill>
@@ -5497,8 +5963,8 @@
         </p:blipFill>
         <p:spPr>
           <a:xfrm>
-            <a:off x="4572000" y="1524000"/>
-            <a:ext cx="4466420" cy="4576578"/>
+            <a:off x="3048000" y="990600"/>
+            <a:ext cx="5699098" cy="4267200"/>
           </a:xfrm>
         </p:spPr>
       </p:pic>
@@ -5544,7 +6010,7 @@
           <a:p>
             <a:r>
               <a:rPr lang="en-US" dirty="0" smtClean="0"/>
-              <a:t>VLM2</a:t>
+              <a:t>Lifting Surface Theory</a:t>
             </a:r>
             <a:endParaRPr lang="en-US" dirty="0"/>
           </a:p>
@@ -5567,13 +6033,50 @@
           <a:p>
             <a:r>
               <a:rPr lang="en-US" dirty="0" smtClean="0"/>
-              <a:t>Uses quad or ring vortices on surface</a:t>
-            </a:r>
-          </a:p>
-          <a:p>
-            <a:r>
-              <a:rPr lang="en-US" dirty="0" smtClean="0"/>
-              <a:t>Uses horseshoe vortices on trailing edge to model wake</a:t>
+              <a:t>Series of lifting lines</a:t>
+            </a:r>
+          </a:p>
+          <a:p>
+            <a:r>
+              <a:rPr lang="en-US" dirty="0" smtClean="0"/>
+              <a:t>Circulation varies in both</a:t>
+            </a:r>
+          </a:p>
+          <a:p>
+            <a:pPr lvl="1"/>
+            <a:r>
+              <a:rPr lang="en-US" dirty="0" smtClean="0">
+                <a:solidFill>
+                  <a:schemeClr val="tx1"/>
+                </a:solidFill>
+              </a:rPr>
+              <a:t>Span wise lifting line</a:t>
+            </a:r>
+          </a:p>
+          <a:p>
+            <a:pPr lvl="1"/>
+            <a:r>
+              <a:rPr lang="en-US" dirty="0" smtClean="0">
+                <a:solidFill>
+                  <a:schemeClr val="tx1"/>
+                </a:solidFill>
+              </a:rPr>
+              <a:t>Chord wise </a:t>
+            </a:r>
+            <a:r>
+              <a:rPr lang="en-US" dirty="0" smtClean="0">
+                <a:solidFill>
+                  <a:schemeClr val="tx1"/>
+                </a:solidFill>
+              </a:rPr>
+              <a:t>vortices</a:t>
+            </a:r>
+            <a:endParaRPr lang="en-US" dirty="0" smtClean="0"/>
+          </a:p>
+          <a:p>
+            <a:r>
+              <a:rPr lang="en-US" dirty="0" smtClean="0"/>
+              <a:t>Chord wise vortices extend into wake.</a:t>
             </a:r>
           </a:p>
           <a:p>
@@ -5581,17 +6084,19 @@
               <a:rPr lang="en-US" dirty="0" err="1" smtClean="0"/>
               <a:t>Biot-Savart</a:t>
             </a:r>
-            <a:r>
-              <a:rPr lang="en-US" dirty="0" smtClean="0"/>
-              <a:t> has V~1/r^3 so difference in trailing vortices is typically minor</a:t>
-            </a:r>
-            <a:endParaRPr lang="en-US" dirty="0"/>
+            <a:endParaRPr lang="en-US" dirty="0" smtClean="0"/>
+          </a:p>
+          <a:p>
+            <a:r>
+              <a:rPr lang="en-US" dirty="0" smtClean="0"/>
+              <a:t>Flow tangency condition</a:t>
+            </a:r>
           </a:p>
         </p:txBody>
       </p:sp>
       <p:pic>
         <p:nvPicPr>
-          <p:cNvPr id="6" name="Content Placeholder 5" descr="VLM2.PNG"/>
+          <p:cNvPr id="8" name="Content Placeholder 7" descr="lsurface.PNG"/>
           <p:cNvPicPr>
             <a:picLocks noGrp="1" noChangeAspect="1"/>
           </p:cNvPicPr>
@@ -5607,8 +6112,8 @@
         </p:blipFill>
         <p:spPr>
           <a:xfrm>
-            <a:off x="4648200" y="1676400"/>
-            <a:ext cx="4347012" cy="3962400"/>
+            <a:off x="4267200" y="1371600"/>
+            <a:ext cx="4657603" cy="4343400"/>
           </a:xfrm>
         </p:spPr>
       </p:pic>

</xml_diff>